<commit_message>
Updated documentation to remove ancient stuff and update the Automation / Pipeline sections
</commit_message>
<xml_diff>
--- a/Documentation/PipelineExample.pptx
+++ b/Documentation/PipelineExample.pptx
@@ -5,8 +5,10 @@
     <p:sldMasterId id="2147483648" r:id="rId1"/>
   </p:sldMasterIdLst>
   <p:sldIdLst>
-    <p:sldId id="256" r:id="rId2"/>
-    <p:sldId id="257" r:id="rId3"/>
+    <p:sldId id="258" r:id="rId2"/>
+    <p:sldId id="259" r:id="rId3"/>
+    <p:sldId id="256" r:id="rId4"/>
+    <p:sldId id="257" r:id="rId5"/>
   </p:sldIdLst>
   <p:sldSz cx="12192000" cy="6858000"/>
   <p:notesSz cx="6858000" cy="9144000"/>
@@ -105,6 +107,11 @@
       </a:defRPr>
     </a:lvl9pPr>
   </p:defaultTextStyle>
+  <p:extLst>
+    <p:ext uri="{EFAFB233-063F-42B5-8137-9DF3F51BA10A}">
+      <p15:sldGuideLst xmlns:p15="http://schemas.microsoft.com/office/powerpoint/2012/main"/>
+    </p:ext>
+  </p:extLst>
 </p:presentation>
 </file>
 
@@ -150,7 +157,7 @@
           </a:lstStyle>
           <a:p>
             <a:r>
-              <a:rPr lang="en-US" smtClean="0"/>
+              <a:rPr lang="en-US"/>
               <a:t>Click to edit Master title style</a:t>
             </a:r>
             <a:endParaRPr lang="en-GB"/>
@@ -215,7 +222,7 @@
           </a:lstStyle>
           <a:p>
             <a:r>
-              <a:rPr lang="en-US" smtClean="0"/>
+              <a:rPr lang="en-US"/>
               <a:t>Click to edit Master subtitle style</a:t>
             </a:r>
             <a:endParaRPr lang="en-GB"/>
@@ -239,7 +246,7 @@
           <a:p>
             <a:fld id="{8EBF9398-3201-418D-9E8C-550EB1730D0E}" type="datetimeFigureOut">
               <a:rPr lang="en-GB" smtClean="0"/>
-              <a:t>09/11/2015</a:t>
+              <a:t>22/08/2018</a:t>
             </a:fld>
             <a:endParaRPr lang="en-GB"/>
           </a:p>
@@ -333,7 +340,7 @@
           <a:lstStyle/>
           <a:p>
             <a:r>
-              <a:rPr lang="en-US" smtClean="0"/>
+              <a:rPr lang="en-US"/>
               <a:t>Click to edit Master title style</a:t>
             </a:r>
             <a:endParaRPr lang="en-GB"/>
@@ -357,35 +364,35 @@
           <a:p>
             <a:pPr lvl="0"/>
             <a:r>
-              <a:rPr lang="en-US" smtClean="0"/>
+              <a:rPr lang="en-US"/>
               <a:t>Click to edit Master text styles</a:t>
             </a:r>
           </a:p>
           <a:p>
             <a:pPr lvl="1"/>
             <a:r>
-              <a:rPr lang="en-US" smtClean="0"/>
+              <a:rPr lang="en-US"/>
               <a:t>Second level</a:t>
             </a:r>
           </a:p>
           <a:p>
             <a:pPr lvl="2"/>
             <a:r>
-              <a:rPr lang="en-US" smtClean="0"/>
+              <a:rPr lang="en-US"/>
               <a:t>Third level</a:t>
             </a:r>
           </a:p>
           <a:p>
             <a:pPr lvl="3"/>
             <a:r>
-              <a:rPr lang="en-US" smtClean="0"/>
+              <a:rPr lang="en-US"/>
               <a:t>Fourth level</a:t>
             </a:r>
           </a:p>
           <a:p>
             <a:pPr lvl="4"/>
             <a:r>
-              <a:rPr lang="en-US" smtClean="0"/>
+              <a:rPr lang="en-US"/>
               <a:t>Fifth level</a:t>
             </a:r>
             <a:endParaRPr lang="en-GB"/>
@@ -409,7 +416,7 @@
           <a:p>
             <a:fld id="{8EBF9398-3201-418D-9E8C-550EB1730D0E}" type="datetimeFigureOut">
               <a:rPr lang="en-GB" smtClean="0"/>
-              <a:t>09/11/2015</a:t>
+              <a:t>22/08/2018</a:t>
             </a:fld>
             <a:endParaRPr lang="en-GB"/>
           </a:p>
@@ -508,7 +515,7 @@
           <a:lstStyle/>
           <a:p>
             <a:r>
-              <a:rPr lang="en-US" smtClean="0"/>
+              <a:rPr lang="en-US"/>
               <a:t>Click to edit Master title style</a:t>
             </a:r>
             <a:endParaRPr lang="en-GB"/>
@@ -537,35 +544,35 @@
           <a:p>
             <a:pPr lvl="0"/>
             <a:r>
-              <a:rPr lang="en-US" smtClean="0"/>
+              <a:rPr lang="en-US"/>
               <a:t>Click to edit Master text styles</a:t>
             </a:r>
           </a:p>
           <a:p>
             <a:pPr lvl="1"/>
             <a:r>
-              <a:rPr lang="en-US" smtClean="0"/>
+              <a:rPr lang="en-US"/>
               <a:t>Second level</a:t>
             </a:r>
           </a:p>
           <a:p>
             <a:pPr lvl="2"/>
             <a:r>
-              <a:rPr lang="en-US" smtClean="0"/>
+              <a:rPr lang="en-US"/>
               <a:t>Third level</a:t>
             </a:r>
           </a:p>
           <a:p>
             <a:pPr lvl="3"/>
             <a:r>
-              <a:rPr lang="en-US" smtClean="0"/>
+              <a:rPr lang="en-US"/>
               <a:t>Fourth level</a:t>
             </a:r>
           </a:p>
           <a:p>
             <a:pPr lvl="4"/>
             <a:r>
-              <a:rPr lang="en-US" smtClean="0"/>
+              <a:rPr lang="en-US"/>
               <a:t>Fifth level</a:t>
             </a:r>
             <a:endParaRPr lang="en-GB"/>
@@ -589,7 +596,7 @@
           <a:p>
             <a:fld id="{8EBF9398-3201-418D-9E8C-550EB1730D0E}" type="datetimeFigureOut">
               <a:rPr lang="en-GB" smtClean="0"/>
-              <a:t>09/11/2015</a:t>
+              <a:t>22/08/2018</a:t>
             </a:fld>
             <a:endParaRPr lang="en-GB"/>
           </a:p>
@@ -683,7 +690,7 @@
           <a:lstStyle/>
           <a:p>
             <a:r>
-              <a:rPr lang="en-US" smtClean="0"/>
+              <a:rPr lang="en-US"/>
               <a:t>Click to edit Master title style</a:t>
             </a:r>
             <a:endParaRPr lang="en-GB"/>
@@ -707,35 +714,35 @@
           <a:p>
             <a:pPr lvl="0"/>
             <a:r>
-              <a:rPr lang="en-US" smtClean="0"/>
+              <a:rPr lang="en-US"/>
               <a:t>Click to edit Master text styles</a:t>
             </a:r>
           </a:p>
           <a:p>
             <a:pPr lvl="1"/>
             <a:r>
-              <a:rPr lang="en-US" smtClean="0"/>
+              <a:rPr lang="en-US"/>
               <a:t>Second level</a:t>
             </a:r>
           </a:p>
           <a:p>
             <a:pPr lvl="2"/>
             <a:r>
-              <a:rPr lang="en-US" smtClean="0"/>
+              <a:rPr lang="en-US"/>
               <a:t>Third level</a:t>
             </a:r>
           </a:p>
           <a:p>
             <a:pPr lvl="3"/>
             <a:r>
-              <a:rPr lang="en-US" smtClean="0"/>
+              <a:rPr lang="en-US"/>
               <a:t>Fourth level</a:t>
             </a:r>
           </a:p>
           <a:p>
             <a:pPr lvl="4"/>
             <a:r>
-              <a:rPr lang="en-US" smtClean="0"/>
+              <a:rPr lang="en-US"/>
               <a:t>Fifth level</a:t>
             </a:r>
             <a:endParaRPr lang="en-GB"/>
@@ -759,7 +766,7 @@
           <a:p>
             <a:fld id="{8EBF9398-3201-418D-9E8C-550EB1730D0E}" type="datetimeFigureOut">
               <a:rPr lang="en-GB" smtClean="0"/>
-              <a:t>09/11/2015</a:t>
+              <a:t>22/08/2018</a:t>
             </a:fld>
             <a:endParaRPr lang="en-GB"/>
           </a:p>
@@ -862,7 +869,7 @@
           </a:lstStyle>
           <a:p>
             <a:r>
-              <a:rPr lang="en-US" smtClean="0"/>
+              <a:rPr lang="en-US"/>
               <a:t>Click to edit Master title style</a:t>
             </a:r>
             <a:endParaRPr lang="en-GB"/>
@@ -982,7 +989,7 @@
           <a:p>
             <a:pPr lvl="0"/>
             <a:r>
-              <a:rPr lang="en-US" smtClean="0"/>
+              <a:rPr lang="en-US"/>
               <a:t>Click to edit Master text styles</a:t>
             </a:r>
           </a:p>
@@ -1005,7 +1012,7 @@
           <a:p>
             <a:fld id="{8EBF9398-3201-418D-9E8C-550EB1730D0E}" type="datetimeFigureOut">
               <a:rPr lang="en-GB" smtClean="0"/>
-              <a:t>09/11/2015</a:t>
+              <a:t>22/08/2018</a:t>
             </a:fld>
             <a:endParaRPr lang="en-GB"/>
           </a:p>
@@ -1099,7 +1106,7 @@
           <a:lstStyle/>
           <a:p>
             <a:r>
-              <a:rPr lang="en-US" smtClean="0"/>
+              <a:rPr lang="en-US"/>
               <a:t>Click to edit Master title style</a:t>
             </a:r>
             <a:endParaRPr lang="en-GB"/>
@@ -1128,35 +1135,35 @@
           <a:p>
             <a:pPr lvl="0"/>
             <a:r>
-              <a:rPr lang="en-US" smtClean="0"/>
+              <a:rPr lang="en-US"/>
               <a:t>Click to edit Master text styles</a:t>
             </a:r>
           </a:p>
           <a:p>
             <a:pPr lvl="1"/>
             <a:r>
-              <a:rPr lang="en-US" smtClean="0"/>
+              <a:rPr lang="en-US"/>
               <a:t>Second level</a:t>
             </a:r>
           </a:p>
           <a:p>
             <a:pPr lvl="2"/>
             <a:r>
-              <a:rPr lang="en-US" smtClean="0"/>
+              <a:rPr lang="en-US"/>
               <a:t>Third level</a:t>
             </a:r>
           </a:p>
           <a:p>
             <a:pPr lvl="3"/>
             <a:r>
-              <a:rPr lang="en-US" smtClean="0"/>
+              <a:rPr lang="en-US"/>
               <a:t>Fourth level</a:t>
             </a:r>
           </a:p>
           <a:p>
             <a:pPr lvl="4"/>
             <a:r>
-              <a:rPr lang="en-US" smtClean="0"/>
+              <a:rPr lang="en-US"/>
               <a:t>Fifth level</a:t>
             </a:r>
             <a:endParaRPr lang="en-GB"/>
@@ -1185,35 +1192,35 @@
           <a:p>
             <a:pPr lvl="0"/>
             <a:r>
-              <a:rPr lang="en-US" smtClean="0"/>
+              <a:rPr lang="en-US"/>
               <a:t>Click to edit Master text styles</a:t>
             </a:r>
           </a:p>
           <a:p>
             <a:pPr lvl="1"/>
             <a:r>
-              <a:rPr lang="en-US" smtClean="0"/>
+              <a:rPr lang="en-US"/>
               <a:t>Second level</a:t>
             </a:r>
           </a:p>
           <a:p>
             <a:pPr lvl="2"/>
             <a:r>
-              <a:rPr lang="en-US" smtClean="0"/>
+              <a:rPr lang="en-US"/>
               <a:t>Third level</a:t>
             </a:r>
           </a:p>
           <a:p>
             <a:pPr lvl="3"/>
             <a:r>
-              <a:rPr lang="en-US" smtClean="0"/>
+              <a:rPr lang="en-US"/>
               <a:t>Fourth level</a:t>
             </a:r>
           </a:p>
           <a:p>
             <a:pPr lvl="4"/>
             <a:r>
-              <a:rPr lang="en-US" smtClean="0"/>
+              <a:rPr lang="en-US"/>
               <a:t>Fifth level</a:t>
             </a:r>
             <a:endParaRPr lang="en-GB"/>
@@ -1237,7 +1244,7 @@
           <a:p>
             <a:fld id="{8EBF9398-3201-418D-9E8C-550EB1730D0E}" type="datetimeFigureOut">
               <a:rPr lang="en-GB" smtClean="0"/>
-              <a:t>09/11/2015</a:t>
+              <a:t>22/08/2018</a:t>
             </a:fld>
             <a:endParaRPr lang="en-GB"/>
           </a:p>
@@ -1336,7 +1343,7 @@
           <a:lstStyle/>
           <a:p>
             <a:r>
-              <a:rPr lang="en-US" smtClean="0"/>
+              <a:rPr lang="en-US"/>
               <a:t>Click to edit Master title style</a:t>
             </a:r>
             <a:endParaRPr lang="en-GB"/>
@@ -1402,7 +1409,7 @@
           <a:p>
             <a:pPr lvl="0"/>
             <a:r>
-              <a:rPr lang="en-US" smtClean="0"/>
+              <a:rPr lang="en-US"/>
               <a:t>Click to edit Master text styles</a:t>
             </a:r>
           </a:p>
@@ -1430,35 +1437,35 @@
           <a:p>
             <a:pPr lvl="0"/>
             <a:r>
-              <a:rPr lang="en-US" smtClean="0"/>
+              <a:rPr lang="en-US"/>
               <a:t>Click to edit Master text styles</a:t>
             </a:r>
           </a:p>
           <a:p>
             <a:pPr lvl="1"/>
             <a:r>
-              <a:rPr lang="en-US" smtClean="0"/>
+              <a:rPr lang="en-US"/>
               <a:t>Second level</a:t>
             </a:r>
           </a:p>
           <a:p>
             <a:pPr lvl="2"/>
             <a:r>
-              <a:rPr lang="en-US" smtClean="0"/>
+              <a:rPr lang="en-US"/>
               <a:t>Third level</a:t>
             </a:r>
           </a:p>
           <a:p>
             <a:pPr lvl="3"/>
             <a:r>
-              <a:rPr lang="en-US" smtClean="0"/>
+              <a:rPr lang="en-US"/>
               <a:t>Fourth level</a:t>
             </a:r>
           </a:p>
           <a:p>
             <a:pPr lvl="4"/>
             <a:r>
-              <a:rPr lang="en-US" smtClean="0"/>
+              <a:rPr lang="en-US"/>
               <a:t>Fifth level</a:t>
             </a:r>
             <a:endParaRPr lang="en-GB"/>
@@ -1524,7 +1531,7 @@
           <a:p>
             <a:pPr lvl="0"/>
             <a:r>
-              <a:rPr lang="en-US" smtClean="0"/>
+              <a:rPr lang="en-US"/>
               <a:t>Click to edit Master text styles</a:t>
             </a:r>
           </a:p>
@@ -1552,35 +1559,35 @@
           <a:p>
             <a:pPr lvl="0"/>
             <a:r>
-              <a:rPr lang="en-US" smtClean="0"/>
+              <a:rPr lang="en-US"/>
               <a:t>Click to edit Master text styles</a:t>
             </a:r>
           </a:p>
           <a:p>
             <a:pPr lvl="1"/>
             <a:r>
-              <a:rPr lang="en-US" smtClean="0"/>
+              <a:rPr lang="en-US"/>
               <a:t>Second level</a:t>
             </a:r>
           </a:p>
           <a:p>
             <a:pPr lvl="2"/>
             <a:r>
-              <a:rPr lang="en-US" smtClean="0"/>
+              <a:rPr lang="en-US"/>
               <a:t>Third level</a:t>
             </a:r>
           </a:p>
           <a:p>
             <a:pPr lvl="3"/>
             <a:r>
-              <a:rPr lang="en-US" smtClean="0"/>
+              <a:rPr lang="en-US"/>
               <a:t>Fourth level</a:t>
             </a:r>
           </a:p>
           <a:p>
             <a:pPr lvl="4"/>
             <a:r>
-              <a:rPr lang="en-US" smtClean="0"/>
+              <a:rPr lang="en-US"/>
               <a:t>Fifth level</a:t>
             </a:r>
             <a:endParaRPr lang="en-GB"/>
@@ -1604,7 +1611,7 @@
           <a:p>
             <a:fld id="{8EBF9398-3201-418D-9E8C-550EB1730D0E}" type="datetimeFigureOut">
               <a:rPr lang="en-GB" smtClean="0"/>
-              <a:t>09/11/2015</a:t>
+              <a:t>22/08/2018</a:t>
             </a:fld>
             <a:endParaRPr lang="en-GB"/>
           </a:p>
@@ -1698,7 +1705,7 @@
           <a:lstStyle/>
           <a:p>
             <a:r>
-              <a:rPr lang="en-US" smtClean="0"/>
+              <a:rPr lang="en-US"/>
               <a:t>Click to edit Master title style</a:t>
             </a:r>
             <a:endParaRPr lang="en-GB"/>
@@ -1722,7 +1729,7 @@
           <a:p>
             <a:fld id="{8EBF9398-3201-418D-9E8C-550EB1730D0E}" type="datetimeFigureOut">
               <a:rPr lang="en-GB" smtClean="0"/>
-              <a:t>09/11/2015</a:t>
+              <a:t>22/08/2018</a:t>
             </a:fld>
             <a:endParaRPr lang="en-GB"/>
           </a:p>
@@ -1817,7 +1824,7 @@
           <a:p>
             <a:fld id="{8EBF9398-3201-418D-9E8C-550EB1730D0E}" type="datetimeFigureOut">
               <a:rPr lang="en-GB" smtClean="0"/>
-              <a:t>09/11/2015</a:t>
+              <a:t>22/08/2018</a:t>
             </a:fld>
             <a:endParaRPr lang="en-GB"/>
           </a:p>
@@ -1920,7 +1927,7 @@
           </a:lstStyle>
           <a:p>
             <a:r>
-              <a:rPr lang="en-US" smtClean="0"/>
+              <a:rPr lang="en-US"/>
               <a:t>Click to edit Master title style</a:t>
             </a:r>
             <a:endParaRPr lang="en-GB"/>
@@ -1977,35 +1984,35 @@
           <a:p>
             <a:pPr lvl="0"/>
             <a:r>
-              <a:rPr lang="en-US" smtClean="0"/>
+              <a:rPr lang="en-US"/>
               <a:t>Click to edit Master text styles</a:t>
             </a:r>
           </a:p>
           <a:p>
             <a:pPr lvl="1"/>
             <a:r>
-              <a:rPr lang="en-US" smtClean="0"/>
+              <a:rPr lang="en-US"/>
               <a:t>Second level</a:t>
             </a:r>
           </a:p>
           <a:p>
             <a:pPr lvl="2"/>
             <a:r>
-              <a:rPr lang="en-US" smtClean="0"/>
+              <a:rPr lang="en-US"/>
               <a:t>Third level</a:t>
             </a:r>
           </a:p>
           <a:p>
             <a:pPr lvl="3"/>
             <a:r>
-              <a:rPr lang="en-US" smtClean="0"/>
+              <a:rPr lang="en-US"/>
               <a:t>Fourth level</a:t>
             </a:r>
           </a:p>
           <a:p>
             <a:pPr lvl="4"/>
             <a:r>
-              <a:rPr lang="en-US" smtClean="0"/>
+              <a:rPr lang="en-US"/>
               <a:t>Fifth level</a:t>
             </a:r>
             <a:endParaRPr lang="en-GB"/>
@@ -2071,7 +2078,7 @@
           <a:p>
             <a:pPr lvl="0"/>
             <a:r>
-              <a:rPr lang="en-US" smtClean="0"/>
+              <a:rPr lang="en-US"/>
               <a:t>Click to edit Master text styles</a:t>
             </a:r>
           </a:p>
@@ -2094,7 +2101,7 @@
           <a:p>
             <a:fld id="{8EBF9398-3201-418D-9E8C-550EB1730D0E}" type="datetimeFigureOut">
               <a:rPr lang="en-GB" smtClean="0"/>
-              <a:t>09/11/2015</a:t>
+              <a:t>22/08/2018</a:t>
             </a:fld>
             <a:endParaRPr lang="en-GB"/>
           </a:p>
@@ -2197,7 +2204,7 @@
           </a:lstStyle>
           <a:p>
             <a:r>
-              <a:rPr lang="en-US" smtClean="0"/>
+              <a:rPr lang="en-US"/>
               <a:t>Click to edit Master title style</a:t>
             </a:r>
             <a:endParaRPr lang="en-GB"/>
@@ -2324,7 +2331,7 @@
           <a:p>
             <a:pPr lvl="0"/>
             <a:r>
-              <a:rPr lang="en-US" smtClean="0"/>
+              <a:rPr lang="en-US"/>
               <a:t>Click to edit Master text styles</a:t>
             </a:r>
           </a:p>
@@ -2347,7 +2354,7 @@
           <a:p>
             <a:fld id="{8EBF9398-3201-418D-9E8C-550EB1730D0E}" type="datetimeFigureOut">
               <a:rPr lang="en-GB" smtClean="0"/>
-              <a:t>09/11/2015</a:t>
+              <a:t>22/08/2018</a:t>
             </a:fld>
             <a:endParaRPr lang="en-GB"/>
           </a:p>
@@ -2456,7 +2463,7 @@
           <a:lstStyle/>
           <a:p>
             <a:r>
-              <a:rPr lang="en-US" smtClean="0"/>
+              <a:rPr lang="en-US"/>
               <a:t>Click to edit Master title style</a:t>
             </a:r>
             <a:endParaRPr lang="en-GB"/>
@@ -2490,35 +2497,35 @@
           <a:p>
             <a:pPr lvl="0"/>
             <a:r>
-              <a:rPr lang="en-US" smtClean="0"/>
+              <a:rPr lang="en-US"/>
               <a:t>Click to edit Master text styles</a:t>
             </a:r>
           </a:p>
           <a:p>
             <a:pPr lvl="1"/>
             <a:r>
-              <a:rPr lang="en-US" smtClean="0"/>
+              <a:rPr lang="en-US"/>
               <a:t>Second level</a:t>
             </a:r>
           </a:p>
           <a:p>
             <a:pPr lvl="2"/>
             <a:r>
-              <a:rPr lang="en-US" smtClean="0"/>
+              <a:rPr lang="en-US"/>
               <a:t>Third level</a:t>
             </a:r>
           </a:p>
           <a:p>
             <a:pPr lvl="3"/>
             <a:r>
-              <a:rPr lang="en-US" smtClean="0"/>
+              <a:rPr lang="en-US"/>
               <a:t>Fourth level</a:t>
             </a:r>
           </a:p>
           <a:p>
             <a:pPr lvl="4"/>
             <a:r>
-              <a:rPr lang="en-US" smtClean="0"/>
+              <a:rPr lang="en-US"/>
               <a:t>Fifth level</a:t>
             </a:r>
             <a:endParaRPr lang="en-GB"/>
@@ -2560,7 +2567,7 @@
           <a:p>
             <a:fld id="{8EBF9398-3201-418D-9E8C-550EB1730D0E}" type="datetimeFigureOut">
               <a:rPr lang="en-GB" smtClean="0"/>
-              <a:t>09/11/2015</a:t>
+              <a:t>22/08/2018</a:t>
             </a:fld>
             <a:endParaRPr lang="en-GB"/>
           </a:p>
@@ -2965,92 +2972,72 @@
           <a:chExt cx="0" cy="0"/>
         </a:xfrm>
       </p:grpSpPr>
-      <p:pic>
-        <p:nvPicPr>
-          <p:cNvPr id="4" name="Picture 3"/>
-          <p:cNvPicPr>
-            <a:picLocks noChangeAspect="1"/>
-          </p:cNvPicPr>
+      <p:sp>
+        <p:nvSpPr>
+          <p:cNvPr id="2" name="Title 1">
+            <a:extLst>
+              <a:ext uri="{FF2B5EF4-FFF2-40B4-BE49-F238E27FC236}">
+                <a16:creationId xmlns:a16="http://schemas.microsoft.com/office/drawing/2014/main" id="{CDC80966-407D-466C-A713-BF6D2F5399D7}"/>
+              </a:ext>
+            </a:extLst>
+          </p:cNvPr>
+          <p:cNvSpPr>
+            <a:spLocks noGrp="1"/>
+          </p:cNvSpPr>
+          <p:nvPr>
+            <p:ph type="title"/>
+          </p:nvPr>
+        </p:nvSpPr>
+        <p:spPr/>
+        <p:txBody>
+          <a:bodyPr/>
+          <a:lstStyle/>
+          <a:p>
+            <a:endParaRPr lang="en-GB"/>
+          </a:p>
+        </p:txBody>
+      </p:sp>
+      <p:sp>
+        <p:nvSpPr>
+          <p:cNvPr id="6" name="Rectangle 5">
+            <a:extLst>
+              <a:ext uri="{FF2B5EF4-FFF2-40B4-BE49-F238E27FC236}">
+                <a16:creationId xmlns:a16="http://schemas.microsoft.com/office/drawing/2014/main" id="{BB2AFA50-A7C0-4382-B5C4-188AFE3D8BEE}"/>
+              </a:ext>
+            </a:extLst>
+          </p:cNvPr>
+          <p:cNvSpPr/>
           <p:nvPr/>
-        </p:nvPicPr>
-        <p:blipFill>
-          <a:blip r:embed="rId2"/>
-          <a:stretch>
-            <a:fillRect/>
-          </a:stretch>
-        </p:blipFill>
-        <p:spPr>
-          <a:xfrm>
-            <a:off x="1450280" y="658043"/>
-            <a:ext cx="943107" cy="981212"/>
+        </p:nvSpPr>
+        <p:spPr>
+          <a:xfrm>
+            <a:off x="1870744" y="1950349"/>
+            <a:ext cx="6744749" cy="3192102"/>
           </a:xfrm>
           <a:prstGeom prst="rect">
             <a:avLst/>
           </a:prstGeom>
-        </p:spPr>
-      </p:pic>
-      <p:pic>
-        <p:nvPicPr>
-          <p:cNvPr id="5" name="Picture 4"/>
-          <p:cNvPicPr>
-            <a:picLocks noChangeAspect="1"/>
-          </p:cNvPicPr>
-          <p:nvPr/>
-        </p:nvPicPr>
-        <p:blipFill>
-          <a:blip r:embed="rId3"/>
-          <a:stretch>
-            <a:fillRect/>
-          </a:stretch>
-        </p:blipFill>
-        <p:spPr>
-          <a:xfrm>
-            <a:off x="445252" y="2072322"/>
-            <a:ext cx="2400635" cy="1971950"/>
-          </a:xfrm>
-          <a:prstGeom prst="rect">
-            <a:avLst/>
-          </a:prstGeom>
-        </p:spPr>
-      </p:pic>
-      <p:pic>
-        <p:nvPicPr>
-          <p:cNvPr id="6" name="Picture 5"/>
-          <p:cNvPicPr>
-            <a:picLocks noChangeAspect="1"/>
-          </p:cNvPicPr>
-          <p:nvPr/>
-        </p:nvPicPr>
-        <p:blipFill>
-          <a:blip r:embed="rId4"/>
-          <a:stretch>
-            <a:fillRect/>
-          </a:stretch>
-        </p:blipFill>
-        <p:spPr>
-          <a:xfrm>
-            <a:off x="2393387" y="4044272"/>
-            <a:ext cx="390580" cy="476316"/>
-          </a:xfrm>
-          <a:prstGeom prst="rect">
-            <a:avLst/>
-          </a:prstGeom>
-        </p:spPr>
-      </p:pic>
-      <p:sp>
-        <p:nvSpPr>
-          <p:cNvPr id="7" name="Right Arrow 6"/>
-          <p:cNvSpPr/>
-          <p:nvPr/>
-        </p:nvSpPr>
-        <p:spPr>
-          <a:xfrm>
-            <a:off x="2845887" y="4044272"/>
-            <a:ext cx="700502" cy="238158"/>
-          </a:xfrm>
-          <a:prstGeom prst="rightArrow">
-            <a:avLst/>
-          </a:prstGeom>
+          <a:ln>
+            <a:noFill/>
+          </a:ln>
+          <a:effectLst>
+            <a:outerShdw blurRad="57785" dist="33020" dir="3180000" algn="ctr">
+              <a:srgbClr val="000000">
+                <a:alpha val="30000"/>
+              </a:srgbClr>
+            </a:outerShdw>
+          </a:effectLst>
+          <a:scene3d>
+            <a:camera prst="orthographicFront">
+              <a:rot lat="0" lon="0" rev="0"/>
+            </a:camera>
+            <a:lightRig rig="brightRoom" dir="t">
+              <a:rot lat="0" lon="0" rev="600000"/>
+            </a:lightRig>
+          </a:scene3d>
+          <a:sp3d prstMaterial="metal">
+            <a:bevelT w="38100" h="57150" prst="angle"/>
+          </a:sp3d>
         </p:spPr>
         <p:style>
           <a:lnRef idx="2">
@@ -3069,24 +3056,714 @@
           </a:fontRef>
         </p:style>
         <p:txBody>
-          <a:bodyPr rtlCol="0" anchor="ctr"/>
+          <a:bodyPr rtlCol="0" anchor="t"/>
           <a:lstStyle/>
           <a:p>
             <a:pPr algn="ctr"/>
-            <a:endParaRPr lang="en-GB"/>
-          </a:p>
-        </p:txBody>
-      </p:sp>
-      <p:sp>
-        <p:nvSpPr>
-          <p:cNvPr id="9" name="Right Arrow 8"/>
+            <a:r>
+              <a:rPr lang="en-US"/>
+              <a:t>Pipeline Use Case</a:t>
+            </a:r>
+            <a:endParaRPr lang="en-GB"/>
+          </a:p>
+        </p:txBody>
+      </p:sp>
+      <p:sp>
+        <p:nvSpPr>
+          <p:cNvPr id="7" name="Rectangle 6">
+            <a:extLst>
+              <a:ext uri="{FF2B5EF4-FFF2-40B4-BE49-F238E27FC236}">
+                <a16:creationId xmlns:a16="http://schemas.microsoft.com/office/drawing/2014/main" id="{A95A337B-3D59-4E10-83D2-BFD5AD2EF4B4}"/>
+              </a:ext>
+            </a:extLst>
+          </p:cNvPr>
           <p:cNvSpPr/>
           <p:nvPr/>
         </p:nvSpPr>
         <p:spPr>
-          <a:xfrm rot="5400000">
-            <a:off x="1708063" y="1739472"/>
-            <a:ext cx="404160" cy="261539"/>
+          <a:xfrm>
+            <a:off x="2030136" y="2416029"/>
+            <a:ext cx="6358855" cy="310393"/>
+          </a:xfrm>
+          <a:prstGeom prst="rect">
+            <a:avLst/>
+          </a:prstGeom>
+          <a:ln>
+            <a:noFill/>
+          </a:ln>
+          <a:effectLst>
+            <a:outerShdw blurRad="44450" dist="27940" dir="5400000" algn="ctr">
+              <a:srgbClr val="000000">
+                <a:alpha val="32000"/>
+              </a:srgbClr>
+            </a:outerShdw>
+          </a:effectLst>
+          <a:scene3d>
+            <a:camera prst="orthographicFront">
+              <a:rot lat="0" lon="0" rev="0"/>
+            </a:camera>
+            <a:lightRig rig="balanced" dir="t">
+              <a:rot lat="0" lon="0" rev="8700000"/>
+            </a:lightRig>
+          </a:scene3d>
+          <a:sp3d>
+            <a:bevelT w="190500" h="38100"/>
+          </a:sp3d>
+        </p:spPr>
+        <p:style>
+          <a:lnRef idx="3">
+            <a:schemeClr val="lt1"/>
+          </a:lnRef>
+          <a:fillRef idx="1">
+            <a:schemeClr val="accent6"/>
+          </a:fillRef>
+          <a:effectRef idx="1">
+            <a:schemeClr val="accent6"/>
+          </a:effectRef>
+          <a:fontRef idx="minor">
+            <a:schemeClr val="lt1"/>
+          </a:fontRef>
+        </p:style>
+        <p:txBody>
+          <a:bodyPr rtlCol="0" anchor="ctr"/>
+          <a:lstStyle/>
+          <a:p>
+            <a:pPr algn="ctr"/>
+            <a:r>
+              <a:rPr lang="en-US"/>
+              <a:t>Initialization Objects</a:t>
+            </a:r>
+            <a:endParaRPr lang="en-GB"/>
+          </a:p>
+        </p:txBody>
+      </p:sp>
+      <p:sp>
+        <p:nvSpPr>
+          <p:cNvPr id="9" name="Rectangle 8">
+            <a:extLst>
+              <a:ext uri="{FF2B5EF4-FFF2-40B4-BE49-F238E27FC236}">
+                <a16:creationId xmlns:a16="http://schemas.microsoft.com/office/drawing/2014/main" id="{C3129FF8-E566-4022-838C-D77C82B8E648}"/>
+              </a:ext>
+            </a:extLst>
+          </p:cNvPr>
+          <p:cNvSpPr/>
+          <p:nvPr/>
+        </p:nvSpPr>
+        <p:spPr>
+          <a:xfrm>
+            <a:off x="2030134" y="2795586"/>
+            <a:ext cx="6358855" cy="310393"/>
+          </a:xfrm>
+          <a:prstGeom prst="rect">
+            <a:avLst/>
+          </a:prstGeom>
+          <a:ln>
+            <a:noFill/>
+          </a:ln>
+          <a:effectLst>
+            <a:outerShdw blurRad="44450" dist="27940" dir="5400000" algn="ctr">
+              <a:srgbClr val="000000">
+                <a:alpha val="32000"/>
+              </a:srgbClr>
+            </a:outerShdw>
+          </a:effectLst>
+          <a:scene3d>
+            <a:camera prst="orthographicFront">
+              <a:rot lat="0" lon="0" rev="0"/>
+            </a:camera>
+            <a:lightRig rig="balanced" dir="t">
+              <a:rot lat="0" lon="0" rev="8700000"/>
+            </a:lightRig>
+          </a:scene3d>
+          <a:sp3d>
+            <a:bevelT w="190500" h="38100"/>
+          </a:sp3d>
+        </p:spPr>
+        <p:style>
+          <a:lnRef idx="3">
+            <a:schemeClr val="lt1"/>
+          </a:lnRef>
+          <a:fillRef idx="1">
+            <a:schemeClr val="accent6"/>
+          </a:fillRef>
+          <a:effectRef idx="1">
+            <a:schemeClr val="accent6"/>
+          </a:effectRef>
+          <a:fontRef idx="minor">
+            <a:schemeClr val="lt1"/>
+          </a:fontRef>
+        </p:style>
+        <p:txBody>
+          <a:bodyPr rtlCol="0" anchor="ctr"/>
+          <a:lstStyle/>
+          <a:p>
+            <a:pPr algn="ctr"/>
+            <a:r>
+              <a:rPr lang="en-US"/>
+              <a:t>Initialization Types (Design Time)</a:t>
+            </a:r>
+            <a:endParaRPr lang="en-GB"/>
+          </a:p>
+        </p:txBody>
+      </p:sp>
+      <p:sp>
+        <p:nvSpPr>
+          <p:cNvPr id="10" name="Rectangle 9">
+            <a:extLst>
+              <a:ext uri="{FF2B5EF4-FFF2-40B4-BE49-F238E27FC236}">
+                <a16:creationId xmlns:a16="http://schemas.microsoft.com/office/drawing/2014/main" id="{FE79B237-4B45-45AF-8357-E78E7E0FB37F}"/>
+              </a:ext>
+            </a:extLst>
+          </p:cNvPr>
+          <p:cNvSpPr/>
+          <p:nvPr/>
+        </p:nvSpPr>
+        <p:spPr>
+          <a:xfrm>
+            <a:off x="2030134" y="3862498"/>
+            <a:ext cx="6358855" cy="1112174"/>
+          </a:xfrm>
+          <a:prstGeom prst="rect">
+            <a:avLst/>
+          </a:prstGeom>
+          <a:ln>
+            <a:noFill/>
+          </a:ln>
+          <a:effectLst>
+            <a:outerShdw blurRad="44450" dist="27940" dir="5400000" algn="ctr">
+              <a:srgbClr val="000000">
+                <a:alpha val="32000"/>
+              </a:srgbClr>
+            </a:outerShdw>
+          </a:effectLst>
+          <a:scene3d>
+            <a:camera prst="orthographicFront">
+              <a:rot lat="0" lon="0" rev="0"/>
+            </a:camera>
+            <a:lightRig rig="balanced" dir="t">
+              <a:rot lat="0" lon="0" rev="8700000"/>
+            </a:lightRig>
+          </a:scene3d>
+          <a:sp3d>
+            <a:bevelT w="190500" h="38100"/>
+          </a:sp3d>
+        </p:spPr>
+        <p:style>
+          <a:lnRef idx="3">
+            <a:schemeClr val="lt1"/>
+          </a:lnRef>
+          <a:fillRef idx="1">
+            <a:schemeClr val="accent6"/>
+          </a:fillRef>
+          <a:effectRef idx="1">
+            <a:schemeClr val="accent6"/>
+          </a:effectRef>
+          <a:fontRef idx="minor">
+            <a:schemeClr val="lt1"/>
+          </a:fontRef>
+        </p:style>
+        <p:txBody>
+          <a:bodyPr rtlCol="0" anchor="t"/>
+          <a:lstStyle/>
+          <a:p>
+            <a:pPr algn="ctr"/>
+            <a:r>
+              <a:rPr lang="en-US"/>
+              <a:t>Context</a:t>
+            </a:r>
+            <a:endParaRPr lang="en-GB"/>
+          </a:p>
+        </p:txBody>
+      </p:sp>
+      <p:sp>
+        <p:nvSpPr>
+          <p:cNvPr id="8" name="Rectangle 7">
+            <a:extLst>
+              <a:ext uri="{FF2B5EF4-FFF2-40B4-BE49-F238E27FC236}">
+                <a16:creationId xmlns:a16="http://schemas.microsoft.com/office/drawing/2014/main" id="{85B13765-340B-465B-8439-DEF3E0B46662}"/>
+              </a:ext>
+            </a:extLst>
+          </p:cNvPr>
+          <p:cNvSpPr/>
+          <p:nvPr/>
+        </p:nvSpPr>
+        <p:spPr>
+          <a:xfrm>
+            <a:off x="2030133" y="3162379"/>
+            <a:ext cx="3115114" cy="612757"/>
+          </a:xfrm>
+          <a:prstGeom prst="rect">
+            <a:avLst/>
+          </a:prstGeom>
+          <a:ln>
+            <a:noFill/>
+          </a:ln>
+          <a:effectLst>
+            <a:outerShdw blurRad="44450" dist="27940" dir="5400000" algn="ctr">
+              <a:srgbClr val="000000">
+                <a:alpha val="32000"/>
+              </a:srgbClr>
+            </a:outerShdw>
+          </a:effectLst>
+          <a:scene3d>
+            <a:camera prst="orthographicFront">
+              <a:rot lat="0" lon="0" rev="0"/>
+            </a:camera>
+            <a:lightRig rig="balanced" dir="t">
+              <a:rot lat="0" lon="0" rev="8700000"/>
+            </a:lightRig>
+          </a:scene3d>
+          <a:sp3d>
+            <a:bevelT w="190500" h="38100"/>
+          </a:sp3d>
+        </p:spPr>
+        <p:style>
+          <a:lnRef idx="3">
+            <a:schemeClr val="lt1"/>
+          </a:lnRef>
+          <a:fillRef idx="1">
+            <a:schemeClr val="accent6"/>
+          </a:fillRef>
+          <a:effectRef idx="1">
+            <a:schemeClr val="accent6"/>
+          </a:effectRef>
+          <a:fontRef idx="minor">
+            <a:schemeClr val="lt1"/>
+          </a:fontRef>
+        </p:style>
+        <p:txBody>
+          <a:bodyPr rtlCol="0" anchor="ctr"/>
+          <a:lstStyle/>
+          <a:p>
+            <a:pPr algn="ctr"/>
+            <a:r>
+              <a:rPr lang="en-US"/>
+              <a:t>Fixed Source</a:t>
+            </a:r>
+          </a:p>
+          <a:p>
+            <a:pPr algn="ctr"/>
+            <a:r>
+              <a:rPr lang="en-US"/>
+              <a:t>(optional)</a:t>
+            </a:r>
+            <a:endParaRPr lang="en-GB"/>
+          </a:p>
+        </p:txBody>
+      </p:sp>
+      <p:sp>
+        <p:nvSpPr>
+          <p:cNvPr id="12" name="Rectangle 11">
+            <a:extLst>
+              <a:ext uri="{FF2B5EF4-FFF2-40B4-BE49-F238E27FC236}">
+                <a16:creationId xmlns:a16="http://schemas.microsoft.com/office/drawing/2014/main" id="{39C1438C-0938-446F-8933-97552CEA23FC}"/>
+              </a:ext>
+            </a:extLst>
+          </p:cNvPr>
+          <p:cNvSpPr/>
+          <p:nvPr/>
+        </p:nvSpPr>
+        <p:spPr>
+          <a:xfrm>
+            <a:off x="2220287" y="4309923"/>
+            <a:ext cx="1577130" cy="310393"/>
+          </a:xfrm>
+          <a:prstGeom prst="rect">
+            <a:avLst/>
+          </a:prstGeom>
+          <a:ln>
+            <a:noFill/>
+          </a:ln>
+          <a:effectLst>
+            <a:outerShdw blurRad="44450" dist="27940" dir="5400000" algn="ctr">
+              <a:srgbClr val="000000">
+                <a:alpha val="32000"/>
+              </a:srgbClr>
+            </a:outerShdw>
+          </a:effectLst>
+          <a:scene3d>
+            <a:camera prst="orthographicFront">
+              <a:rot lat="0" lon="0" rev="0"/>
+            </a:camera>
+            <a:lightRig rig="balanced" dir="t">
+              <a:rot lat="0" lon="0" rev="8700000"/>
+            </a:lightRig>
+          </a:scene3d>
+          <a:sp3d>
+            <a:bevelT w="190500" h="38100"/>
+          </a:sp3d>
+        </p:spPr>
+        <p:style>
+          <a:lnRef idx="3">
+            <a:schemeClr val="lt1"/>
+          </a:lnRef>
+          <a:fillRef idx="1">
+            <a:schemeClr val="accent6"/>
+          </a:fillRef>
+          <a:effectRef idx="1">
+            <a:schemeClr val="accent6"/>
+          </a:effectRef>
+          <a:fontRef idx="minor">
+            <a:schemeClr val="lt1"/>
+          </a:fontRef>
+        </p:style>
+        <p:txBody>
+          <a:bodyPr rtlCol="0" anchor="ctr"/>
+          <a:lstStyle/>
+          <a:p>
+            <a:pPr algn="ctr"/>
+            <a:r>
+              <a:rPr lang="en-US"/>
+              <a:t>&lt;T&gt; Flow Type</a:t>
+            </a:r>
+            <a:endParaRPr lang="en-GB"/>
+          </a:p>
+        </p:txBody>
+      </p:sp>
+      <p:sp>
+        <p:nvSpPr>
+          <p:cNvPr id="13" name="Rectangle 12">
+            <a:extLst>
+              <a:ext uri="{FF2B5EF4-FFF2-40B4-BE49-F238E27FC236}">
+                <a16:creationId xmlns:a16="http://schemas.microsoft.com/office/drawing/2014/main" id="{F60C57CE-BFAA-4F34-96F0-B049D907ED26}"/>
+              </a:ext>
+            </a:extLst>
+          </p:cNvPr>
+          <p:cNvSpPr/>
+          <p:nvPr/>
+        </p:nvSpPr>
+        <p:spPr>
+          <a:xfrm>
+            <a:off x="5273875" y="3173846"/>
+            <a:ext cx="3115114" cy="612757"/>
+          </a:xfrm>
+          <a:prstGeom prst="rect">
+            <a:avLst/>
+          </a:prstGeom>
+          <a:ln>
+            <a:noFill/>
+          </a:ln>
+          <a:effectLst>
+            <a:outerShdw blurRad="44450" dist="27940" dir="5400000" algn="ctr">
+              <a:srgbClr val="000000">
+                <a:alpha val="32000"/>
+              </a:srgbClr>
+            </a:outerShdw>
+          </a:effectLst>
+          <a:scene3d>
+            <a:camera prst="orthographicFront">
+              <a:rot lat="0" lon="0" rev="0"/>
+            </a:camera>
+            <a:lightRig rig="balanced" dir="t">
+              <a:rot lat="0" lon="0" rev="8700000"/>
+            </a:lightRig>
+          </a:scene3d>
+          <a:sp3d>
+            <a:bevelT w="190500" h="38100"/>
+          </a:sp3d>
+        </p:spPr>
+        <p:style>
+          <a:lnRef idx="3">
+            <a:schemeClr val="lt1"/>
+          </a:lnRef>
+          <a:fillRef idx="1">
+            <a:schemeClr val="accent6"/>
+          </a:fillRef>
+          <a:effectRef idx="1">
+            <a:schemeClr val="accent6"/>
+          </a:effectRef>
+          <a:fontRef idx="minor">
+            <a:schemeClr val="lt1"/>
+          </a:fontRef>
+        </p:style>
+        <p:txBody>
+          <a:bodyPr rtlCol="0" anchor="ctr"/>
+          <a:lstStyle/>
+          <a:p>
+            <a:pPr algn="ctr"/>
+            <a:r>
+              <a:rPr lang="en-US"/>
+              <a:t>Fixed Destination</a:t>
+            </a:r>
+          </a:p>
+          <a:p>
+            <a:pPr algn="ctr"/>
+            <a:r>
+              <a:rPr lang="en-US"/>
+              <a:t>(optional)</a:t>
+            </a:r>
+            <a:endParaRPr lang="en-GB"/>
+          </a:p>
+        </p:txBody>
+      </p:sp>
+      <p:sp>
+        <p:nvSpPr>
+          <p:cNvPr id="14" name="Rectangle 13">
+            <a:extLst>
+              <a:ext uri="{FF2B5EF4-FFF2-40B4-BE49-F238E27FC236}">
+                <a16:creationId xmlns:a16="http://schemas.microsoft.com/office/drawing/2014/main" id="{80B7468E-C660-461C-B130-CFFAC3866DA8}"/>
+              </a:ext>
+            </a:extLst>
+          </p:cNvPr>
+          <p:cNvSpPr/>
+          <p:nvPr/>
+        </p:nvSpPr>
+        <p:spPr>
+          <a:xfrm>
+            <a:off x="3987569" y="4309923"/>
+            <a:ext cx="4200085" cy="580619"/>
+          </a:xfrm>
+          <a:prstGeom prst="rect">
+            <a:avLst/>
+          </a:prstGeom>
+          <a:ln>
+            <a:noFill/>
+          </a:ln>
+          <a:effectLst>
+            <a:outerShdw blurRad="44450" dist="27940" dir="5400000" algn="ctr">
+              <a:srgbClr val="000000">
+                <a:alpha val="32000"/>
+              </a:srgbClr>
+            </a:outerShdw>
+          </a:effectLst>
+          <a:scene3d>
+            <a:camera prst="orthographicFront">
+              <a:rot lat="0" lon="0" rev="0"/>
+            </a:camera>
+            <a:lightRig rig="balanced" dir="t">
+              <a:rot lat="0" lon="0" rev="8700000"/>
+            </a:lightRig>
+          </a:scene3d>
+          <a:sp3d>
+            <a:bevelT w="190500" h="38100"/>
+          </a:sp3d>
+        </p:spPr>
+        <p:style>
+          <a:lnRef idx="3">
+            <a:schemeClr val="lt1"/>
+          </a:lnRef>
+          <a:fillRef idx="1">
+            <a:schemeClr val="accent6"/>
+          </a:fillRef>
+          <a:effectRef idx="1">
+            <a:schemeClr val="accent6"/>
+          </a:effectRef>
+          <a:fontRef idx="minor">
+            <a:schemeClr val="lt1"/>
+          </a:fontRef>
+        </p:style>
+        <p:txBody>
+          <a:bodyPr rtlCol="0" anchor="ctr"/>
+          <a:lstStyle/>
+          <a:p>
+            <a:pPr algn="ctr"/>
+            <a:r>
+              <a:rPr lang="en-US"/>
+              <a:t>Required Component Type(s)</a:t>
+            </a:r>
+          </a:p>
+          <a:p>
+            <a:pPr algn="ctr"/>
+            <a:r>
+              <a:rPr lang="en-US"/>
+              <a:t>(optional)</a:t>
+            </a:r>
+            <a:endParaRPr lang="en-GB"/>
+          </a:p>
+        </p:txBody>
+      </p:sp>
+    </p:spTree>
+    <p:extLst>
+      <p:ext uri="{BB962C8B-B14F-4D97-AF65-F5344CB8AC3E}">
+        <p14:creationId xmlns:p14="http://schemas.microsoft.com/office/powerpoint/2010/main" val="3920081925"/>
+      </p:ext>
+    </p:extLst>
+  </p:cSld>
+  <p:clrMapOvr>
+    <a:masterClrMapping/>
+  </p:clrMapOvr>
+</p:sld>
+</file>
+
+<file path=ppt/slides/slide2.xml><?xml version="1.0" encoding="utf-8"?>
+<p:sld xmlns:a="http://schemas.openxmlformats.org/drawingml/2006/main" xmlns:r="http://schemas.openxmlformats.org/officeDocument/2006/relationships" xmlns:p="http://schemas.openxmlformats.org/presentationml/2006/main">
+  <p:cSld>
+    <p:spTree>
+      <p:nvGrpSpPr>
+        <p:cNvPr id="1" name=""/>
+        <p:cNvGrpSpPr/>
+        <p:nvPr/>
+      </p:nvGrpSpPr>
+      <p:grpSpPr>
+        <a:xfrm>
+          <a:off x="0" y="0"/>
+          <a:ext cx="0" cy="0"/>
+          <a:chOff x="0" y="0"/>
+          <a:chExt cx="0" cy="0"/>
+        </a:xfrm>
+      </p:grpSpPr>
+      <p:sp>
+        <p:nvSpPr>
+          <p:cNvPr id="2" name="Title 1">
+            <a:extLst>
+              <a:ext uri="{FF2B5EF4-FFF2-40B4-BE49-F238E27FC236}">
+                <a16:creationId xmlns:a16="http://schemas.microsoft.com/office/drawing/2014/main" id="{7345BDCB-3149-49FE-BD1D-CF489F2C099C}"/>
+              </a:ext>
+            </a:extLst>
+          </p:cNvPr>
+          <p:cNvSpPr>
+            <a:spLocks noGrp="1"/>
+          </p:cNvSpPr>
+          <p:nvPr>
+            <p:ph type="title"/>
+          </p:nvPr>
+        </p:nvSpPr>
+        <p:spPr/>
+        <p:txBody>
+          <a:bodyPr/>
+          <a:lstStyle/>
+          <a:p>
+            <a:endParaRPr lang="en-GB"/>
+          </a:p>
+        </p:txBody>
+      </p:sp>
+      <p:sp>
+        <p:nvSpPr>
+          <p:cNvPr id="3" name="Content Placeholder 2">
+            <a:extLst>
+              <a:ext uri="{FF2B5EF4-FFF2-40B4-BE49-F238E27FC236}">
+                <a16:creationId xmlns:a16="http://schemas.microsoft.com/office/drawing/2014/main" id="{3FF8F4F7-6369-4238-A4EE-594BDBEA46EF}"/>
+              </a:ext>
+            </a:extLst>
+          </p:cNvPr>
+          <p:cNvSpPr>
+            <a:spLocks noGrp="1"/>
+          </p:cNvSpPr>
+          <p:nvPr>
+            <p:ph idx="1"/>
+          </p:nvPr>
+        </p:nvSpPr>
+        <p:spPr/>
+        <p:txBody>
+          <a:bodyPr/>
+          <a:lstStyle/>
+          <a:p>
+            <a:endParaRPr lang="en-GB"/>
+          </a:p>
+        </p:txBody>
+      </p:sp>
+    </p:spTree>
+    <p:extLst>
+      <p:ext uri="{BB962C8B-B14F-4D97-AF65-F5344CB8AC3E}">
+        <p14:creationId xmlns:p14="http://schemas.microsoft.com/office/powerpoint/2010/main" val="2162629433"/>
+      </p:ext>
+    </p:extLst>
+  </p:cSld>
+  <p:clrMapOvr>
+    <a:masterClrMapping/>
+  </p:clrMapOvr>
+</p:sld>
+</file>
+
+<file path=ppt/slides/slide3.xml><?xml version="1.0" encoding="utf-8"?>
+<p:sld xmlns:a="http://schemas.openxmlformats.org/drawingml/2006/main" xmlns:r="http://schemas.openxmlformats.org/officeDocument/2006/relationships" xmlns:p="http://schemas.openxmlformats.org/presentationml/2006/main">
+  <p:cSld>
+    <p:spTree>
+      <p:nvGrpSpPr>
+        <p:cNvPr id="1" name=""/>
+        <p:cNvGrpSpPr/>
+        <p:nvPr/>
+      </p:nvGrpSpPr>
+      <p:grpSpPr>
+        <a:xfrm>
+          <a:off x="0" y="0"/>
+          <a:ext cx="0" cy="0"/>
+          <a:chOff x="0" y="0"/>
+          <a:chExt cx="0" cy="0"/>
+        </a:xfrm>
+      </p:grpSpPr>
+      <p:pic>
+        <p:nvPicPr>
+          <p:cNvPr id="4" name="Picture 3"/>
+          <p:cNvPicPr>
+            <a:picLocks noChangeAspect="1"/>
+          </p:cNvPicPr>
+          <p:nvPr/>
+        </p:nvPicPr>
+        <p:blipFill>
+          <a:blip r:embed="rId2"/>
+          <a:stretch>
+            <a:fillRect/>
+          </a:stretch>
+        </p:blipFill>
+        <p:spPr>
+          <a:xfrm>
+            <a:off x="1450280" y="658043"/>
+            <a:ext cx="943107" cy="981212"/>
+          </a:xfrm>
+          <a:prstGeom prst="rect">
+            <a:avLst/>
+          </a:prstGeom>
+        </p:spPr>
+      </p:pic>
+      <p:pic>
+        <p:nvPicPr>
+          <p:cNvPr id="5" name="Picture 4"/>
+          <p:cNvPicPr>
+            <a:picLocks noChangeAspect="1"/>
+          </p:cNvPicPr>
+          <p:nvPr/>
+        </p:nvPicPr>
+        <p:blipFill>
+          <a:blip r:embed="rId3"/>
+          <a:stretch>
+            <a:fillRect/>
+          </a:stretch>
+        </p:blipFill>
+        <p:spPr>
+          <a:xfrm>
+            <a:off x="445252" y="2072322"/>
+            <a:ext cx="2400635" cy="1971950"/>
+          </a:xfrm>
+          <a:prstGeom prst="rect">
+            <a:avLst/>
+          </a:prstGeom>
+        </p:spPr>
+      </p:pic>
+      <p:pic>
+        <p:nvPicPr>
+          <p:cNvPr id="6" name="Picture 5"/>
+          <p:cNvPicPr>
+            <a:picLocks noChangeAspect="1"/>
+          </p:cNvPicPr>
+          <p:nvPr/>
+        </p:nvPicPr>
+        <p:blipFill>
+          <a:blip r:embed="rId4"/>
+          <a:stretch>
+            <a:fillRect/>
+          </a:stretch>
+        </p:blipFill>
+        <p:spPr>
+          <a:xfrm>
+            <a:off x="2393387" y="4044272"/>
+            <a:ext cx="390580" cy="476316"/>
+          </a:xfrm>
+          <a:prstGeom prst="rect">
+            <a:avLst/>
+          </a:prstGeom>
+        </p:spPr>
+      </p:pic>
+      <p:sp>
+        <p:nvSpPr>
+          <p:cNvPr id="7" name="Right Arrow 6"/>
+          <p:cNvSpPr/>
+          <p:nvPr/>
+        </p:nvSpPr>
+        <p:spPr>
+          <a:xfrm>
+            <a:off x="2845887" y="4044272"/>
+            <a:ext cx="700502" cy="238158"/>
           </a:xfrm>
           <a:prstGeom prst="rightArrow">
             <a:avLst/>
@@ -3113,44 +3790,20 @@
           <a:lstStyle/>
           <a:p>
             <a:pPr algn="ctr"/>
-            <a:endParaRPr lang="en-GB" dirty="0"/>
-          </a:p>
-        </p:txBody>
-      </p:sp>
-      <p:pic>
-        <p:nvPicPr>
-          <p:cNvPr id="11" name="Picture 10"/>
-          <p:cNvPicPr>
-            <a:picLocks noChangeAspect="1"/>
-          </p:cNvPicPr>
-          <p:nvPr/>
-        </p:nvPicPr>
-        <p:blipFill>
-          <a:blip r:embed="rId4"/>
-          <a:stretch>
-            <a:fillRect/>
-          </a:stretch>
-        </p:blipFill>
-        <p:spPr>
-          <a:xfrm>
-            <a:off x="5222578" y="4024544"/>
-            <a:ext cx="390580" cy="476316"/>
-          </a:xfrm>
-          <a:prstGeom prst="rect">
-            <a:avLst/>
-          </a:prstGeom>
-        </p:spPr>
-      </p:pic>
-      <p:sp>
-        <p:nvSpPr>
-          <p:cNvPr id="12" name="Right Arrow 11"/>
+            <a:endParaRPr lang="en-GB"/>
+          </a:p>
+        </p:txBody>
+      </p:sp>
+      <p:sp>
+        <p:nvSpPr>
+          <p:cNvPr id="9" name="Right Arrow 8"/>
           <p:cNvSpPr/>
           <p:nvPr/>
         </p:nvSpPr>
         <p:spPr>
-          <a:xfrm>
-            <a:off x="4794022" y="4044272"/>
-            <a:ext cx="428556" cy="238158"/>
+          <a:xfrm rot="5400000">
+            <a:off x="1708063" y="1739472"/>
+            <a:ext cx="404160" cy="261539"/>
           </a:xfrm>
           <a:prstGeom prst="rightArrow">
             <a:avLst/>
@@ -3177,13 +3830,13 @@
           <a:lstStyle/>
           <a:p>
             <a:pPr algn="ctr"/>
-            <a:endParaRPr lang="en-GB"/>
+            <a:endParaRPr lang="en-GB" dirty="0"/>
           </a:p>
         </p:txBody>
       </p:sp>
       <p:pic>
         <p:nvPicPr>
-          <p:cNvPr id="14" name="Picture 13"/>
+          <p:cNvPr id="11" name="Picture 10"/>
           <p:cNvPicPr>
             <a:picLocks noChangeAspect="1"/>
           </p:cNvPicPr>
@@ -3197,7 +3850,7 @@
         </p:blipFill>
         <p:spPr>
           <a:xfrm>
-            <a:off x="7273735" y="4024544"/>
+            <a:off x="5222578" y="4024544"/>
             <a:ext cx="390580" cy="476316"/>
           </a:xfrm>
           <a:prstGeom prst="rect">
@@ -3207,13 +3860,13 @@
       </p:pic>
       <p:sp>
         <p:nvSpPr>
-          <p:cNvPr id="15" name="Right Arrow 14"/>
+          <p:cNvPr id="12" name="Right Arrow 11"/>
           <p:cNvSpPr/>
           <p:nvPr/>
         </p:nvSpPr>
         <p:spPr>
           <a:xfrm>
-            <a:off x="6845179" y="4044272"/>
+            <a:off x="4794022" y="4044272"/>
             <a:ext cx="428556" cy="238158"/>
           </a:xfrm>
           <a:prstGeom prst="rightArrow">
@@ -3245,6 +3898,70 @@
           </a:p>
         </p:txBody>
       </p:sp>
+      <p:pic>
+        <p:nvPicPr>
+          <p:cNvPr id="14" name="Picture 13"/>
+          <p:cNvPicPr>
+            <a:picLocks noChangeAspect="1"/>
+          </p:cNvPicPr>
+          <p:nvPr/>
+        </p:nvPicPr>
+        <p:blipFill>
+          <a:blip r:embed="rId4"/>
+          <a:stretch>
+            <a:fillRect/>
+          </a:stretch>
+        </p:blipFill>
+        <p:spPr>
+          <a:xfrm>
+            <a:off x="7273735" y="4024544"/>
+            <a:ext cx="390580" cy="476316"/>
+          </a:xfrm>
+          <a:prstGeom prst="rect">
+            <a:avLst/>
+          </a:prstGeom>
+        </p:spPr>
+      </p:pic>
+      <p:sp>
+        <p:nvSpPr>
+          <p:cNvPr id="15" name="Right Arrow 14"/>
+          <p:cNvSpPr/>
+          <p:nvPr/>
+        </p:nvSpPr>
+        <p:spPr>
+          <a:xfrm>
+            <a:off x="6845179" y="4044272"/>
+            <a:ext cx="428556" cy="238158"/>
+          </a:xfrm>
+          <a:prstGeom prst="rightArrow">
+            <a:avLst/>
+          </a:prstGeom>
+        </p:spPr>
+        <p:style>
+          <a:lnRef idx="2">
+            <a:schemeClr val="accent1">
+              <a:shade val="50000"/>
+            </a:schemeClr>
+          </a:lnRef>
+          <a:fillRef idx="1">
+            <a:schemeClr val="accent1"/>
+          </a:fillRef>
+          <a:effectRef idx="0">
+            <a:schemeClr val="accent1"/>
+          </a:effectRef>
+          <a:fontRef idx="minor">
+            <a:schemeClr val="lt1"/>
+          </a:fontRef>
+        </p:style>
+        <p:txBody>
+          <a:bodyPr rtlCol="0" anchor="ctr"/>
+          <a:lstStyle/>
+          <a:p>
+            <a:pPr algn="ctr"/>
+            <a:endParaRPr lang="en-GB"/>
+          </a:p>
+        </p:txBody>
+      </p:sp>
       <p:sp>
         <p:nvSpPr>
           <p:cNvPr id="10" name="TextBox 9"/>
@@ -3268,19 +3985,19 @@
           <a:lstStyle/>
           <a:p>
             <a:r>
-              <a:rPr lang="en-US" dirty="0" smtClean="0"/>
+              <a:rPr lang="en-US" dirty="0"/>
               <a:t>Email sent to database manager</a:t>
             </a:r>
           </a:p>
           <a:p>
             <a:r>
-              <a:rPr lang="en-US" dirty="0" smtClean="0"/>
+              <a:rPr lang="en-US" dirty="0"/>
               <a:t>telling him a data load is taking </a:t>
             </a:r>
           </a:p>
           <a:p>
             <a:r>
-              <a:rPr lang="en-US" dirty="0" smtClean="0"/>
+              <a:rPr lang="en-US" dirty="0"/>
               <a:t>place</a:t>
             </a:r>
             <a:endParaRPr lang="en-GB" dirty="0"/>
@@ -3503,14 +4220,14 @@
           <a:lstStyle/>
           <a:p>
             <a:r>
-              <a:rPr lang="en-US" dirty="0" smtClean="0"/>
+              <a:rPr lang="en-US" dirty="0"/>
               <a:t>Anonymisation</a:t>
             </a:r>
           </a:p>
           <a:p>
             <a:pPr algn="ctr"/>
             <a:r>
-              <a:rPr lang="en-US" dirty="0" smtClean="0"/>
+              <a:rPr lang="en-US" dirty="0"/>
               <a:t>Database</a:t>
             </a:r>
             <a:endParaRPr lang="en-GB" dirty="0"/>
@@ -3540,14 +4257,14 @@
           <a:lstStyle/>
           <a:p>
             <a:r>
-              <a:rPr lang="en-US" dirty="0" smtClean="0"/>
+              <a:rPr lang="en-US" dirty="0"/>
               <a:t>Anonymisation</a:t>
             </a:r>
           </a:p>
           <a:p>
             <a:pPr algn="ctr"/>
             <a:r>
-              <a:rPr lang="en-US" dirty="0" smtClean="0"/>
+              <a:rPr lang="en-US" dirty="0"/>
               <a:t>Component</a:t>
             </a:r>
             <a:endParaRPr lang="en-GB" dirty="0"/>
@@ -3577,13 +4294,13 @@
           <a:lstStyle/>
           <a:p>
             <a:r>
-              <a:rPr lang="en-US" dirty="0" smtClean="0"/>
+              <a:rPr lang="en-US" dirty="0"/>
               <a:t>Email </a:t>
             </a:r>
           </a:p>
           <a:p>
             <a:r>
-              <a:rPr lang="en-US" dirty="0" smtClean="0"/>
+              <a:rPr lang="en-US" dirty="0"/>
               <a:t>Component</a:t>
             </a:r>
             <a:endParaRPr lang="en-GB" dirty="0"/>
@@ -3798,13 +4515,13 @@
           <a:lstStyle/>
           <a:p>
             <a:r>
-              <a:rPr lang="en-US" dirty="0" smtClean="0"/>
+              <a:rPr lang="en-US" dirty="0"/>
               <a:t>Source</a:t>
             </a:r>
           </a:p>
           <a:p>
             <a:r>
-              <a:rPr lang="en-US" dirty="0" smtClean="0"/>
+              <a:rPr lang="en-US" dirty="0"/>
               <a:t>Component</a:t>
             </a:r>
           </a:p>
@@ -3833,13 +4550,13 @@
           <a:lstStyle/>
           <a:p>
             <a:r>
-              <a:rPr lang="en-US" dirty="0" smtClean="0"/>
+              <a:rPr lang="en-US" dirty="0"/>
               <a:t>Destination</a:t>
             </a:r>
           </a:p>
           <a:p>
             <a:r>
-              <a:rPr lang="en-US" dirty="0" smtClean="0"/>
+              <a:rPr lang="en-US" dirty="0"/>
               <a:t>Component</a:t>
             </a:r>
           </a:p>
@@ -3855,17 +4572,10 @@
   <p:clrMapOvr>
     <a:masterClrMapping/>
   </p:clrMapOvr>
-  <p:timing>
-    <p:tnLst>
-      <p:par>
-        <p:cTn id="1" dur="indefinite" restart="never" nodeType="tmRoot"/>
-      </p:par>
-    </p:tnLst>
-  </p:timing>
 </p:sld>
 </file>
 
-<file path=ppt/slides/slide2.xml><?xml version="1.0" encoding="utf-8"?>
+<file path=ppt/slides/slide4.xml><?xml version="1.0" encoding="utf-8"?>
 <p:sld xmlns:a="http://schemas.openxmlformats.org/drawingml/2006/main" xmlns:r="http://schemas.openxmlformats.org/officeDocument/2006/relationships" xmlns:p="http://schemas.openxmlformats.org/presentationml/2006/main">
   <p:cSld>
     <p:spTree>
@@ -3930,13 +4640,6 @@
   <p:clrMapOvr>
     <a:masterClrMapping/>
   </p:clrMapOvr>
-  <p:timing>
-    <p:tnLst>
-      <p:par>
-        <p:cTn id="1" dur="indefinite" restart="never" nodeType="tmRoot"/>
-      </p:par>
-    </p:tnLst>
-  </p:timing>
 </p:sld>
 </file>
 

</xml_diff>

<commit_message>
RDMPDEV-1336 Deleted old inaccurate documentation files
</commit_message>
<xml_diff>
--- a/Documentation/PipelineExample.pptx
+++ b/Documentation/PipelineExample.pptx
@@ -6,9 +6,6 @@
   </p:sldMasterIdLst>
   <p:sldIdLst>
     <p:sldId id="258" r:id="rId2"/>
-    <p:sldId id="259" r:id="rId3"/>
-    <p:sldId id="256" r:id="rId4"/>
-    <p:sldId id="257" r:id="rId5"/>
   </p:sldIdLst>
   <p:sldSz cx="12192000" cy="6858000"/>
   <p:notesSz cx="6858000" cy="9144000"/>
@@ -246,7 +243,7 @@
           <a:p>
             <a:fld id="{8EBF9398-3201-418D-9E8C-550EB1730D0E}" type="datetimeFigureOut">
               <a:rPr lang="en-GB" smtClean="0"/>
-              <a:t>22/08/2018</a:t>
+              <a:t>21/02/2019</a:t>
             </a:fld>
             <a:endParaRPr lang="en-GB"/>
           </a:p>
@@ -416,7 +413,7 @@
           <a:p>
             <a:fld id="{8EBF9398-3201-418D-9E8C-550EB1730D0E}" type="datetimeFigureOut">
               <a:rPr lang="en-GB" smtClean="0"/>
-              <a:t>22/08/2018</a:t>
+              <a:t>21/02/2019</a:t>
             </a:fld>
             <a:endParaRPr lang="en-GB"/>
           </a:p>
@@ -596,7 +593,7 @@
           <a:p>
             <a:fld id="{8EBF9398-3201-418D-9E8C-550EB1730D0E}" type="datetimeFigureOut">
               <a:rPr lang="en-GB" smtClean="0"/>
-              <a:t>22/08/2018</a:t>
+              <a:t>21/02/2019</a:t>
             </a:fld>
             <a:endParaRPr lang="en-GB"/>
           </a:p>
@@ -766,7 +763,7 @@
           <a:p>
             <a:fld id="{8EBF9398-3201-418D-9E8C-550EB1730D0E}" type="datetimeFigureOut">
               <a:rPr lang="en-GB" smtClean="0"/>
-              <a:t>22/08/2018</a:t>
+              <a:t>21/02/2019</a:t>
             </a:fld>
             <a:endParaRPr lang="en-GB"/>
           </a:p>
@@ -1012,7 +1009,7 @@
           <a:p>
             <a:fld id="{8EBF9398-3201-418D-9E8C-550EB1730D0E}" type="datetimeFigureOut">
               <a:rPr lang="en-GB" smtClean="0"/>
-              <a:t>22/08/2018</a:t>
+              <a:t>21/02/2019</a:t>
             </a:fld>
             <a:endParaRPr lang="en-GB"/>
           </a:p>
@@ -1244,7 +1241,7 @@
           <a:p>
             <a:fld id="{8EBF9398-3201-418D-9E8C-550EB1730D0E}" type="datetimeFigureOut">
               <a:rPr lang="en-GB" smtClean="0"/>
-              <a:t>22/08/2018</a:t>
+              <a:t>21/02/2019</a:t>
             </a:fld>
             <a:endParaRPr lang="en-GB"/>
           </a:p>
@@ -1611,7 +1608,7 @@
           <a:p>
             <a:fld id="{8EBF9398-3201-418D-9E8C-550EB1730D0E}" type="datetimeFigureOut">
               <a:rPr lang="en-GB" smtClean="0"/>
-              <a:t>22/08/2018</a:t>
+              <a:t>21/02/2019</a:t>
             </a:fld>
             <a:endParaRPr lang="en-GB"/>
           </a:p>
@@ -1729,7 +1726,7 @@
           <a:p>
             <a:fld id="{8EBF9398-3201-418D-9E8C-550EB1730D0E}" type="datetimeFigureOut">
               <a:rPr lang="en-GB" smtClean="0"/>
-              <a:t>22/08/2018</a:t>
+              <a:t>21/02/2019</a:t>
             </a:fld>
             <a:endParaRPr lang="en-GB"/>
           </a:p>
@@ -1824,7 +1821,7 @@
           <a:p>
             <a:fld id="{8EBF9398-3201-418D-9E8C-550EB1730D0E}" type="datetimeFigureOut">
               <a:rPr lang="en-GB" smtClean="0"/>
-              <a:t>22/08/2018</a:t>
+              <a:t>21/02/2019</a:t>
             </a:fld>
             <a:endParaRPr lang="en-GB"/>
           </a:p>
@@ -2101,7 +2098,7 @@
           <a:p>
             <a:fld id="{8EBF9398-3201-418D-9E8C-550EB1730D0E}" type="datetimeFigureOut">
               <a:rPr lang="en-GB" smtClean="0"/>
-              <a:t>22/08/2018</a:t>
+              <a:t>21/02/2019</a:t>
             </a:fld>
             <a:endParaRPr lang="en-GB"/>
           </a:p>
@@ -2354,7 +2351,7 @@
           <a:p>
             <a:fld id="{8EBF9398-3201-418D-9E8C-550EB1730D0E}" type="datetimeFigureOut">
               <a:rPr lang="en-GB" smtClean="0"/>
-              <a:t>22/08/2018</a:t>
+              <a:t>21/02/2019</a:t>
             </a:fld>
             <a:endParaRPr lang="en-GB"/>
           </a:p>
@@ -2567,7 +2564,7 @@
           <a:p>
             <a:fld id="{8EBF9398-3201-418D-9E8C-550EB1730D0E}" type="datetimeFigureOut">
               <a:rPr lang="en-GB" smtClean="0"/>
-              <a:t>22/08/2018</a:t>
+              <a:t>21/02/2019</a:t>
             </a:fld>
             <a:endParaRPr lang="en-GB"/>
           </a:p>
@@ -3585,1064 +3582,6 @@
 </p:sld>
 </file>
 
-<file path=ppt/slides/slide2.xml><?xml version="1.0" encoding="utf-8"?>
-<p:sld xmlns:a="http://schemas.openxmlformats.org/drawingml/2006/main" xmlns:r="http://schemas.openxmlformats.org/officeDocument/2006/relationships" xmlns:p="http://schemas.openxmlformats.org/presentationml/2006/main">
-  <p:cSld>
-    <p:spTree>
-      <p:nvGrpSpPr>
-        <p:cNvPr id="1" name=""/>
-        <p:cNvGrpSpPr/>
-        <p:nvPr/>
-      </p:nvGrpSpPr>
-      <p:grpSpPr>
-        <a:xfrm>
-          <a:off x="0" y="0"/>
-          <a:ext cx="0" cy="0"/>
-          <a:chOff x="0" y="0"/>
-          <a:chExt cx="0" cy="0"/>
-        </a:xfrm>
-      </p:grpSpPr>
-      <p:sp>
-        <p:nvSpPr>
-          <p:cNvPr id="2" name="Title 1">
-            <a:extLst>
-              <a:ext uri="{FF2B5EF4-FFF2-40B4-BE49-F238E27FC236}">
-                <a16:creationId xmlns:a16="http://schemas.microsoft.com/office/drawing/2014/main" id="{7345BDCB-3149-49FE-BD1D-CF489F2C099C}"/>
-              </a:ext>
-            </a:extLst>
-          </p:cNvPr>
-          <p:cNvSpPr>
-            <a:spLocks noGrp="1"/>
-          </p:cNvSpPr>
-          <p:nvPr>
-            <p:ph type="title"/>
-          </p:nvPr>
-        </p:nvSpPr>
-        <p:spPr/>
-        <p:txBody>
-          <a:bodyPr/>
-          <a:lstStyle/>
-          <a:p>
-            <a:endParaRPr lang="en-GB"/>
-          </a:p>
-        </p:txBody>
-      </p:sp>
-      <p:sp>
-        <p:nvSpPr>
-          <p:cNvPr id="3" name="Content Placeholder 2">
-            <a:extLst>
-              <a:ext uri="{FF2B5EF4-FFF2-40B4-BE49-F238E27FC236}">
-                <a16:creationId xmlns:a16="http://schemas.microsoft.com/office/drawing/2014/main" id="{3FF8F4F7-6369-4238-A4EE-594BDBEA46EF}"/>
-              </a:ext>
-            </a:extLst>
-          </p:cNvPr>
-          <p:cNvSpPr>
-            <a:spLocks noGrp="1"/>
-          </p:cNvSpPr>
-          <p:nvPr>
-            <p:ph idx="1"/>
-          </p:nvPr>
-        </p:nvSpPr>
-        <p:spPr/>
-        <p:txBody>
-          <a:bodyPr/>
-          <a:lstStyle/>
-          <a:p>
-            <a:endParaRPr lang="en-GB"/>
-          </a:p>
-        </p:txBody>
-      </p:sp>
-    </p:spTree>
-    <p:extLst>
-      <p:ext uri="{BB962C8B-B14F-4D97-AF65-F5344CB8AC3E}">
-        <p14:creationId xmlns:p14="http://schemas.microsoft.com/office/powerpoint/2010/main" val="2162629433"/>
-      </p:ext>
-    </p:extLst>
-  </p:cSld>
-  <p:clrMapOvr>
-    <a:masterClrMapping/>
-  </p:clrMapOvr>
-</p:sld>
-</file>
-
-<file path=ppt/slides/slide3.xml><?xml version="1.0" encoding="utf-8"?>
-<p:sld xmlns:a="http://schemas.openxmlformats.org/drawingml/2006/main" xmlns:r="http://schemas.openxmlformats.org/officeDocument/2006/relationships" xmlns:p="http://schemas.openxmlformats.org/presentationml/2006/main">
-  <p:cSld>
-    <p:spTree>
-      <p:nvGrpSpPr>
-        <p:cNvPr id="1" name=""/>
-        <p:cNvGrpSpPr/>
-        <p:nvPr/>
-      </p:nvGrpSpPr>
-      <p:grpSpPr>
-        <a:xfrm>
-          <a:off x="0" y="0"/>
-          <a:ext cx="0" cy="0"/>
-          <a:chOff x="0" y="0"/>
-          <a:chExt cx="0" cy="0"/>
-        </a:xfrm>
-      </p:grpSpPr>
-      <p:pic>
-        <p:nvPicPr>
-          <p:cNvPr id="4" name="Picture 3"/>
-          <p:cNvPicPr>
-            <a:picLocks noChangeAspect="1"/>
-          </p:cNvPicPr>
-          <p:nvPr/>
-        </p:nvPicPr>
-        <p:blipFill>
-          <a:blip r:embed="rId2"/>
-          <a:stretch>
-            <a:fillRect/>
-          </a:stretch>
-        </p:blipFill>
-        <p:spPr>
-          <a:xfrm>
-            <a:off x="1450280" y="658043"/>
-            <a:ext cx="943107" cy="981212"/>
-          </a:xfrm>
-          <a:prstGeom prst="rect">
-            <a:avLst/>
-          </a:prstGeom>
-        </p:spPr>
-      </p:pic>
-      <p:pic>
-        <p:nvPicPr>
-          <p:cNvPr id="5" name="Picture 4"/>
-          <p:cNvPicPr>
-            <a:picLocks noChangeAspect="1"/>
-          </p:cNvPicPr>
-          <p:nvPr/>
-        </p:nvPicPr>
-        <p:blipFill>
-          <a:blip r:embed="rId3"/>
-          <a:stretch>
-            <a:fillRect/>
-          </a:stretch>
-        </p:blipFill>
-        <p:spPr>
-          <a:xfrm>
-            <a:off x="445252" y="2072322"/>
-            <a:ext cx="2400635" cy="1971950"/>
-          </a:xfrm>
-          <a:prstGeom prst="rect">
-            <a:avLst/>
-          </a:prstGeom>
-        </p:spPr>
-      </p:pic>
-      <p:pic>
-        <p:nvPicPr>
-          <p:cNvPr id="6" name="Picture 5"/>
-          <p:cNvPicPr>
-            <a:picLocks noChangeAspect="1"/>
-          </p:cNvPicPr>
-          <p:nvPr/>
-        </p:nvPicPr>
-        <p:blipFill>
-          <a:blip r:embed="rId4"/>
-          <a:stretch>
-            <a:fillRect/>
-          </a:stretch>
-        </p:blipFill>
-        <p:spPr>
-          <a:xfrm>
-            <a:off x="2393387" y="4044272"/>
-            <a:ext cx="390580" cy="476316"/>
-          </a:xfrm>
-          <a:prstGeom prst="rect">
-            <a:avLst/>
-          </a:prstGeom>
-        </p:spPr>
-      </p:pic>
-      <p:sp>
-        <p:nvSpPr>
-          <p:cNvPr id="7" name="Right Arrow 6"/>
-          <p:cNvSpPr/>
-          <p:nvPr/>
-        </p:nvSpPr>
-        <p:spPr>
-          <a:xfrm>
-            <a:off x="2845887" y="4044272"/>
-            <a:ext cx="700502" cy="238158"/>
-          </a:xfrm>
-          <a:prstGeom prst="rightArrow">
-            <a:avLst/>
-          </a:prstGeom>
-        </p:spPr>
-        <p:style>
-          <a:lnRef idx="2">
-            <a:schemeClr val="accent1">
-              <a:shade val="50000"/>
-            </a:schemeClr>
-          </a:lnRef>
-          <a:fillRef idx="1">
-            <a:schemeClr val="accent1"/>
-          </a:fillRef>
-          <a:effectRef idx="0">
-            <a:schemeClr val="accent1"/>
-          </a:effectRef>
-          <a:fontRef idx="minor">
-            <a:schemeClr val="lt1"/>
-          </a:fontRef>
-        </p:style>
-        <p:txBody>
-          <a:bodyPr rtlCol="0" anchor="ctr"/>
-          <a:lstStyle/>
-          <a:p>
-            <a:pPr algn="ctr"/>
-            <a:endParaRPr lang="en-GB"/>
-          </a:p>
-        </p:txBody>
-      </p:sp>
-      <p:sp>
-        <p:nvSpPr>
-          <p:cNvPr id="9" name="Right Arrow 8"/>
-          <p:cNvSpPr/>
-          <p:nvPr/>
-        </p:nvSpPr>
-        <p:spPr>
-          <a:xfrm rot="5400000">
-            <a:off x="1708063" y="1739472"/>
-            <a:ext cx="404160" cy="261539"/>
-          </a:xfrm>
-          <a:prstGeom prst="rightArrow">
-            <a:avLst/>
-          </a:prstGeom>
-        </p:spPr>
-        <p:style>
-          <a:lnRef idx="2">
-            <a:schemeClr val="accent1">
-              <a:shade val="50000"/>
-            </a:schemeClr>
-          </a:lnRef>
-          <a:fillRef idx="1">
-            <a:schemeClr val="accent1"/>
-          </a:fillRef>
-          <a:effectRef idx="0">
-            <a:schemeClr val="accent1"/>
-          </a:effectRef>
-          <a:fontRef idx="minor">
-            <a:schemeClr val="lt1"/>
-          </a:fontRef>
-        </p:style>
-        <p:txBody>
-          <a:bodyPr rtlCol="0" anchor="ctr"/>
-          <a:lstStyle/>
-          <a:p>
-            <a:pPr algn="ctr"/>
-            <a:endParaRPr lang="en-GB" dirty="0"/>
-          </a:p>
-        </p:txBody>
-      </p:sp>
-      <p:pic>
-        <p:nvPicPr>
-          <p:cNvPr id="11" name="Picture 10"/>
-          <p:cNvPicPr>
-            <a:picLocks noChangeAspect="1"/>
-          </p:cNvPicPr>
-          <p:nvPr/>
-        </p:nvPicPr>
-        <p:blipFill>
-          <a:blip r:embed="rId4"/>
-          <a:stretch>
-            <a:fillRect/>
-          </a:stretch>
-        </p:blipFill>
-        <p:spPr>
-          <a:xfrm>
-            <a:off x="5222578" y="4024544"/>
-            <a:ext cx="390580" cy="476316"/>
-          </a:xfrm>
-          <a:prstGeom prst="rect">
-            <a:avLst/>
-          </a:prstGeom>
-        </p:spPr>
-      </p:pic>
-      <p:sp>
-        <p:nvSpPr>
-          <p:cNvPr id="12" name="Right Arrow 11"/>
-          <p:cNvSpPr/>
-          <p:nvPr/>
-        </p:nvSpPr>
-        <p:spPr>
-          <a:xfrm>
-            <a:off x="4794022" y="4044272"/>
-            <a:ext cx="428556" cy="238158"/>
-          </a:xfrm>
-          <a:prstGeom prst="rightArrow">
-            <a:avLst/>
-          </a:prstGeom>
-        </p:spPr>
-        <p:style>
-          <a:lnRef idx="2">
-            <a:schemeClr val="accent1">
-              <a:shade val="50000"/>
-            </a:schemeClr>
-          </a:lnRef>
-          <a:fillRef idx="1">
-            <a:schemeClr val="accent1"/>
-          </a:fillRef>
-          <a:effectRef idx="0">
-            <a:schemeClr val="accent1"/>
-          </a:effectRef>
-          <a:fontRef idx="minor">
-            <a:schemeClr val="lt1"/>
-          </a:fontRef>
-        </p:style>
-        <p:txBody>
-          <a:bodyPr rtlCol="0" anchor="ctr"/>
-          <a:lstStyle/>
-          <a:p>
-            <a:pPr algn="ctr"/>
-            <a:endParaRPr lang="en-GB"/>
-          </a:p>
-        </p:txBody>
-      </p:sp>
-      <p:pic>
-        <p:nvPicPr>
-          <p:cNvPr id="14" name="Picture 13"/>
-          <p:cNvPicPr>
-            <a:picLocks noChangeAspect="1"/>
-          </p:cNvPicPr>
-          <p:nvPr/>
-        </p:nvPicPr>
-        <p:blipFill>
-          <a:blip r:embed="rId4"/>
-          <a:stretch>
-            <a:fillRect/>
-          </a:stretch>
-        </p:blipFill>
-        <p:spPr>
-          <a:xfrm>
-            <a:off x="7273735" y="4024544"/>
-            <a:ext cx="390580" cy="476316"/>
-          </a:xfrm>
-          <a:prstGeom prst="rect">
-            <a:avLst/>
-          </a:prstGeom>
-        </p:spPr>
-      </p:pic>
-      <p:sp>
-        <p:nvSpPr>
-          <p:cNvPr id="15" name="Right Arrow 14"/>
-          <p:cNvSpPr/>
-          <p:nvPr/>
-        </p:nvSpPr>
-        <p:spPr>
-          <a:xfrm>
-            <a:off x="6845179" y="4044272"/>
-            <a:ext cx="428556" cy="238158"/>
-          </a:xfrm>
-          <a:prstGeom prst="rightArrow">
-            <a:avLst/>
-          </a:prstGeom>
-        </p:spPr>
-        <p:style>
-          <a:lnRef idx="2">
-            <a:schemeClr val="accent1">
-              <a:shade val="50000"/>
-            </a:schemeClr>
-          </a:lnRef>
-          <a:fillRef idx="1">
-            <a:schemeClr val="accent1"/>
-          </a:fillRef>
-          <a:effectRef idx="0">
-            <a:schemeClr val="accent1"/>
-          </a:effectRef>
-          <a:fontRef idx="minor">
-            <a:schemeClr val="lt1"/>
-          </a:fontRef>
-        </p:style>
-        <p:txBody>
-          <a:bodyPr rtlCol="0" anchor="ctr"/>
-          <a:lstStyle/>
-          <a:p>
-            <a:pPr algn="ctr"/>
-            <a:endParaRPr lang="en-GB"/>
-          </a:p>
-        </p:txBody>
-      </p:sp>
-      <p:sp>
-        <p:nvSpPr>
-          <p:cNvPr id="10" name="TextBox 9"/>
-          <p:cNvSpPr txBox="1"/>
-          <p:nvPr/>
-        </p:nvSpPr>
-        <p:spPr>
-          <a:xfrm>
-            <a:off x="2594532" y="5792715"/>
-            <a:ext cx="3190297" cy="923330"/>
-          </a:xfrm>
-          <a:prstGeom prst="rect">
-            <a:avLst/>
-          </a:prstGeom>
-          <a:noFill/>
-        </p:spPr>
-        <p:txBody>
-          <a:bodyPr wrap="none" rtlCol="0">
-            <a:spAutoFit/>
-          </a:bodyPr>
-          <a:lstStyle/>
-          <a:p>
-            <a:r>
-              <a:rPr lang="en-US" dirty="0"/>
-              <a:t>Email sent to database manager</a:t>
-            </a:r>
-          </a:p>
-          <a:p>
-            <a:r>
-              <a:rPr lang="en-US" dirty="0"/>
-              <a:t>telling him a data load is taking </a:t>
-            </a:r>
-          </a:p>
-          <a:p>
-            <a:r>
-              <a:rPr lang="en-US" dirty="0"/>
-              <a:t>place</a:t>
-            </a:r>
-            <a:endParaRPr lang="en-GB" dirty="0"/>
-          </a:p>
-        </p:txBody>
-      </p:sp>
-      <p:pic>
-        <p:nvPicPr>
-          <p:cNvPr id="18" name="Picture 17"/>
-          <p:cNvPicPr>
-            <a:picLocks noChangeAspect="1"/>
-          </p:cNvPicPr>
-          <p:nvPr/>
-        </p:nvPicPr>
-        <p:blipFill>
-          <a:blip r:embed="rId5"/>
-          <a:stretch>
-            <a:fillRect/>
-          </a:stretch>
-        </p:blipFill>
-        <p:spPr>
-          <a:xfrm>
-            <a:off x="7664315" y="3360068"/>
-            <a:ext cx="1747874" cy="1518355"/>
-          </a:xfrm>
-          <a:prstGeom prst="rect">
-            <a:avLst/>
-          </a:prstGeom>
-        </p:spPr>
-      </p:pic>
-      <p:pic>
-        <p:nvPicPr>
-          <p:cNvPr id="20" name="Picture 19"/>
-          <p:cNvPicPr>
-            <a:picLocks noChangeAspect="1"/>
-          </p:cNvPicPr>
-          <p:nvPr/>
-        </p:nvPicPr>
-        <p:blipFill>
-          <a:blip r:embed="rId6"/>
-          <a:stretch>
-            <a:fillRect/>
-          </a:stretch>
-        </p:blipFill>
-        <p:spPr>
-          <a:xfrm rot="10800000">
-            <a:off x="3647261" y="3798331"/>
-            <a:ext cx="1084841" cy="1428374"/>
-          </a:xfrm>
-          <a:prstGeom prst="rect">
-            <a:avLst/>
-          </a:prstGeom>
-        </p:spPr>
-      </p:pic>
-      <p:pic>
-        <p:nvPicPr>
-          <p:cNvPr id="22" name="Picture 21"/>
-          <p:cNvPicPr>
-            <a:picLocks noChangeAspect="1"/>
-          </p:cNvPicPr>
-          <p:nvPr/>
-        </p:nvPicPr>
-        <p:blipFill>
-          <a:blip r:embed="rId6"/>
-          <a:stretch>
-            <a:fillRect/>
-          </a:stretch>
-        </p:blipFill>
-        <p:spPr>
-          <a:xfrm>
-            <a:off x="5705736" y="3072486"/>
-            <a:ext cx="1084841" cy="1428374"/>
-          </a:xfrm>
-          <a:prstGeom prst="rect">
-            <a:avLst/>
-          </a:prstGeom>
-        </p:spPr>
-      </p:pic>
-      <p:sp>
-        <p:nvSpPr>
-          <p:cNvPr id="23" name="Right Arrow 22"/>
-          <p:cNvSpPr/>
-          <p:nvPr/>
-        </p:nvSpPr>
-        <p:spPr>
-          <a:xfrm rot="5400000">
-            <a:off x="4052924" y="5284527"/>
-            <a:ext cx="284574" cy="309579"/>
-          </a:xfrm>
-          <a:prstGeom prst="rightArrow">
-            <a:avLst/>
-          </a:prstGeom>
-        </p:spPr>
-        <p:style>
-          <a:lnRef idx="2">
-            <a:schemeClr val="accent1">
-              <a:shade val="50000"/>
-            </a:schemeClr>
-          </a:lnRef>
-          <a:fillRef idx="1">
-            <a:schemeClr val="accent1"/>
-          </a:fillRef>
-          <a:effectRef idx="0">
-            <a:schemeClr val="accent1"/>
-          </a:effectRef>
-          <a:fontRef idx="minor">
-            <a:schemeClr val="lt1"/>
-          </a:fontRef>
-        </p:style>
-        <p:txBody>
-          <a:bodyPr rtlCol="0" anchor="ctr"/>
-          <a:lstStyle/>
-          <a:p>
-            <a:pPr algn="ctr"/>
-            <a:endParaRPr lang="en-GB"/>
-          </a:p>
-        </p:txBody>
-      </p:sp>
-      <p:sp>
-        <p:nvSpPr>
-          <p:cNvPr id="24" name="Right Arrow 23"/>
-          <p:cNvSpPr/>
-          <p:nvPr/>
-        </p:nvSpPr>
-        <p:spPr>
-          <a:xfrm rot="14211179">
-            <a:off x="4454028" y="2113613"/>
-            <a:ext cx="1893066" cy="212560"/>
-          </a:xfrm>
-          <a:prstGeom prst="rightArrow">
-            <a:avLst/>
-          </a:prstGeom>
-        </p:spPr>
-        <p:style>
-          <a:lnRef idx="2">
-            <a:schemeClr val="accent1">
-              <a:shade val="50000"/>
-            </a:schemeClr>
-          </a:lnRef>
-          <a:fillRef idx="1">
-            <a:schemeClr val="accent1"/>
-          </a:fillRef>
-          <a:effectRef idx="0">
-            <a:schemeClr val="accent1"/>
-          </a:effectRef>
-          <a:fontRef idx="minor">
-            <a:schemeClr val="lt1"/>
-          </a:fontRef>
-        </p:style>
-        <p:txBody>
-          <a:bodyPr rtlCol="0" anchor="ctr"/>
-          <a:lstStyle/>
-          <a:p>
-            <a:pPr algn="ctr"/>
-            <a:endParaRPr lang="en-GB"/>
-          </a:p>
-        </p:txBody>
-      </p:sp>
-      <p:pic>
-        <p:nvPicPr>
-          <p:cNvPr id="1030" name="Picture 6" descr="https://pixabay.com/static/uploads/photo/2013/07/12/17/22/database-152091_640.png"/>
-          <p:cNvPicPr>
-            <a:picLocks noChangeAspect="1" noChangeArrowheads="1"/>
-          </p:cNvPicPr>
-          <p:nvPr/>
-        </p:nvPicPr>
-        <p:blipFill>
-          <a:blip r:embed="rId7" cstate="print">
-            <a:extLst>
-              <a:ext uri="{28A0092B-C50C-407E-A947-70E740481C1C}">
-                <a14:useLocalDpi xmlns:a14="http://schemas.microsoft.com/office/drawing/2010/main" val="0"/>
-              </a:ext>
-            </a:extLst>
-          </a:blip>
-          <a:srcRect/>
-          <a:stretch>
-            <a:fillRect/>
-          </a:stretch>
-        </p:blipFill>
-        <p:spPr bwMode="auto">
-          <a:xfrm>
-            <a:off x="3845194" y="89999"/>
-            <a:ext cx="994491" cy="1097370"/>
-          </a:xfrm>
-          <a:prstGeom prst="rect">
-            <a:avLst/>
-          </a:prstGeom>
-          <a:noFill/>
-          <a:extLst>
-            <a:ext uri="{909E8E84-426E-40DD-AFC4-6F175D3DCCD1}">
-              <a14:hiddenFill xmlns:a14="http://schemas.microsoft.com/office/drawing/2010/main">
-                <a:solidFill>
-                  <a:srgbClr val="FFFFFF"/>
-                </a:solidFill>
-              </a14:hiddenFill>
-            </a:ext>
-          </a:extLst>
-        </p:spPr>
-      </p:pic>
-      <p:sp>
-        <p:nvSpPr>
-          <p:cNvPr id="25" name="TextBox 24"/>
-          <p:cNvSpPr txBox="1"/>
-          <p:nvPr/>
-        </p:nvSpPr>
-        <p:spPr>
-          <a:xfrm>
-            <a:off x="3546389" y="1021830"/>
-            <a:ext cx="1592103" cy="646331"/>
-          </a:xfrm>
-          <a:prstGeom prst="rect">
-            <a:avLst/>
-          </a:prstGeom>
-          <a:noFill/>
-        </p:spPr>
-        <p:txBody>
-          <a:bodyPr wrap="none" rtlCol="0">
-            <a:spAutoFit/>
-          </a:bodyPr>
-          <a:lstStyle/>
-          <a:p>
-            <a:r>
-              <a:rPr lang="en-US" dirty="0"/>
-              <a:t>Anonymisation</a:t>
-            </a:r>
-          </a:p>
-          <a:p>
-            <a:pPr algn="ctr"/>
-            <a:r>
-              <a:rPr lang="en-US" dirty="0"/>
-              <a:t>Database</a:t>
-            </a:r>
-            <a:endParaRPr lang="en-GB" dirty="0"/>
-          </a:p>
-        </p:txBody>
-      </p:sp>
-      <p:sp>
-        <p:nvSpPr>
-          <p:cNvPr id="28" name="TextBox 27"/>
-          <p:cNvSpPr txBox="1"/>
-          <p:nvPr/>
-        </p:nvSpPr>
-        <p:spPr>
-          <a:xfrm>
-            <a:off x="5436244" y="4524141"/>
-            <a:ext cx="1592103" cy="646331"/>
-          </a:xfrm>
-          <a:prstGeom prst="rect">
-            <a:avLst/>
-          </a:prstGeom>
-          <a:noFill/>
-        </p:spPr>
-        <p:txBody>
-          <a:bodyPr wrap="none" rtlCol="0">
-            <a:spAutoFit/>
-          </a:bodyPr>
-          <a:lstStyle/>
-          <a:p>
-            <a:r>
-              <a:rPr lang="en-US" dirty="0"/>
-              <a:t>Anonymisation</a:t>
-            </a:r>
-          </a:p>
-          <a:p>
-            <a:pPr algn="ctr"/>
-            <a:r>
-              <a:rPr lang="en-US" dirty="0"/>
-              <a:t>Component</a:t>
-            </a:r>
-            <a:endParaRPr lang="en-GB" dirty="0"/>
-          </a:p>
-        </p:txBody>
-      </p:sp>
-      <p:sp>
-        <p:nvSpPr>
-          <p:cNvPr id="29" name="TextBox 28"/>
-          <p:cNvSpPr txBox="1"/>
-          <p:nvPr/>
-        </p:nvSpPr>
-        <p:spPr>
-          <a:xfrm>
-            <a:off x="3547856" y="3177355"/>
-            <a:ext cx="1291829" cy="646331"/>
-          </a:xfrm>
-          <a:prstGeom prst="rect">
-            <a:avLst/>
-          </a:prstGeom>
-          <a:noFill/>
-        </p:spPr>
-        <p:txBody>
-          <a:bodyPr wrap="none" rtlCol="0">
-            <a:spAutoFit/>
-          </a:bodyPr>
-          <a:lstStyle/>
-          <a:p>
-            <a:r>
-              <a:rPr lang="en-US" dirty="0"/>
-              <a:t>Email </a:t>
-            </a:r>
-          </a:p>
-          <a:p>
-            <a:r>
-              <a:rPr lang="en-US" dirty="0"/>
-              <a:t>Component</a:t>
-            </a:r>
-            <a:endParaRPr lang="en-GB" dirty="0"/>
-          </a:p>
-        </p:txBody>
-      </p:sp>
-      <p:pic>
-        <p:nvPicPr>
-          <p:cNvPr id="1034" name="Picture 10" descr="http://res.freestockphotos.biz/pictures/16/16586-illustration-of-an-envelope-pv.png"/>
-          <p:cNvPicPr>
-            <a:picLocks noChangeAspect="1" noChangeArrowheads="1"/>
-          </p:cNvPicPr>
-          <p:nvPr/>
-        </p:nvPicPr>
-        <p:blipFill>
-          <a:blip r:embed="rId8" cstate="print">
-            <a:extLst>
-              <a:ext uri="{28A0092B-C50C-407E-A947-70E740481C1C}">
-                <a14:useLocalDpi xmlns:a14="http://schemas.microsoft.com/office/drawing/2010/main" val="0"/>
-              </a:ext>
-            </a:extLst>
-          </a:blip>
-          <a:srcRect/>
-          <a:stretch>
-            <a:fillRect/>
-          </a:stretch>
-        </p:blipFill>
-        <p:spPr bwMode="auto">
-          <a:xfrm>
-            <a:off x="3994401" y="5553695"/>
-            <a:ext cx="381000" cy="381000"/>
-          </a:xfrm>
-          <a:prstGeom prst="rect">
-            <a:avLst/>
-          </a:prstGeom>
-          <a:noFill/>
-          <a:extLst>
-            <a:ext uri="{909E8E84-426E-40DD-AFC4-6F175D3DCCD1}">
-              <a14:hiddenFill xmlns:a14="http://schemas.microsoft.com/office/drawing/2010/main">
-                <a:solidFill>
-                  <a:srgbClr val="FFFFFF"/>
-                </a:solidFill>
-              </a14:hiddenFill>
-            </a:ext>
-          </a:extLst>
-        </p:spPr>
-      </p:pic>
-      <p:sp>
-        <p:nvSpPr>
-          <p:cNvPr id="32" name="Right Arrow 31"/>
-          <p:cNvSpPr/>
-          <p:nvPr/>
-        </p:nvSpPr>
-        <p:spPr>
-          <a:xfrm rot="3459534">
-            <a:off x="4683739" y="2095033"/>
-            <a:ext cx="1982462" cy="206463"/>
-          </a:xfrm>
-          <a:prstGeom prst="rightArrow">
-            <a:avLst/>
-          </a:prstGeom>
-        </p:spPr>
-        <p:style>
-          <a:lnRef idx="2">
-            <a:schemeClr val="accent1">
-              <a:shade val="50000"/>
-            </a:schemeClr>
-          </a:lnRef>
-          <a:fillRef idx="1">
-            <a:schemeClr val="accent1"/>
-          </a:fillRef>
-          <a:effectRef idx="0">
-            <a:schemeClr val="accent1"/>
-          </a:effectRef>
-          <a:fontRef idx="minor">
-            <a:schemeClr val="lt1"/>
-          </a:fontRef>
-        </p:style>
-        <p:txBody>
-          <a:bodyPr rtlCol="0" anchor="ctr"/>
-          <a:lstStyle/>
-          <a:p>
-            <a:pPr algn="ctr"/>
-            <a:endParaRPr lang="en-GB"/>
-          </a:p>
-        </p:txBody>
-      </p:sp>
-      <p:pic>
-        <p:nvPicPr>
-          <p:cNvPr id="30" name="Picture 29"/>
-          <p:cNvPicPr>
-            <a:picLocks noChangeAspect="1"/>
-          </p:cNvPicPr>
-          <p:nvPr/>
-        </p:nvPicPr>
-        <p:blipFill>
-          <a:blip r:embed="rId9"/>
-          <a:stretch>
-            <a:fillRect/>
-          </a:stretch>
-        </p:blipFill>
-        <p:spPr>
-          <a:xfrm>
-            <a:off x="8119083" y="1870241"/>
-            <a:ext cx="990738" cy="971686"/>
-          </a:xfrm>
-          <a:prstGeom prst="rect">
-            <a:avLst/>
-          </a:prstGeom>
-        </p:spPr>
-      </p:pic>
-      <p:sp>
-        <p:nvSpPr>
-          <p:cNvPr id="35" name="Right Arrow 34"/>
-          <p:cNvSpPr/>
-          <p:nvPr/>
-        </p:nvSpPr>
-        <p:spPr>
-          <a:xfrm rot="5400000">
-            <a:off x="8336172" y="2960190"/>
-            <a:ext cx="404160" cy="261539"/>
-          </a:xfrm>
-          <a:prstGeom prst="rightArrow">
-            <a:avLst/>
-          </a:prstGeom>
-        </p:spPr>
-        <p:style>
-          <a:lnRef idx="2">
-            <a:schemeClr val="accent1">
-              <a:shade val="50000"/>
-            </a:schemeClr>
-          </a:lnRef>
-          <a:fillRef idx="1">
-            <a:schemeClr val="accent1"/>
-          </a:fillRef>
-          <a:effectRef idx="0">
-            <a:schemeClr val="accent1"/>
-          </a:effectRef>
-          <a:fontRef idx="minor">
-            <a:schemeClr val="lt1"/>
-          </a:fontRef>
-        </p:style>
-        <p:txBody>
-          <a:bodyPr rtlCol="0" anchor="ctr"/>
-          <a:lstStyle/>
-          <a:p>
-            <a:pPr algn="ctr"/>
-            <a:endParaRPr lang="en-GB" dirty="0"/>
-          </a:p>
-        </p:txBody>
-      </p:sp>
-      <p:sp>
-        <p:nvSpPr>
-          <p:cNvPr id="36" name="Right Arrow 35"/>
-          <p:cNvSpPr/>
-          <p:nvPr/>
-        </p:nvSpPr>
-        <p:spPr>
-          <a:xfrm rot="16200000">
-            <a:off x="8599999" y="2939740"/>
-            <a:ext cx="404160" cy="261539"/>
-          </a:xfrm>
-          <a:prstGeom prst="rightArrow">
-            <a:avLst/>
-          </a:prstGeom>
-        </p:spPr>
-        <p:style>
-          <a:lnRef idx="2">
-            <a:schemeClr val="accent1">
-              <a:shade val="50000"/>
-            </a:schemeClr>
-          </a:lnRef>
-          <a:fillRef idx="1">
-            <a:schemeClr val="accent1"/>
-          </a:fillRef>
-          <a:effectRef idx="0">
-            <a:schemeClr val="accent1"/>
-          </a:effectRef>
-          <a:fontRef idx="minor">
-            <a:schemeClr val="lt1"/>
-          </a:fontRef>
-        </p:style>
-        <p:txBody>
-          <a:bodyPr rtlCol="0" anchor="ctr"/>
-          <a:lstStyle/>
-          <a:p>
-            <a:pPr algn="ctr"/>
-            <a:endParaRPr lang="en-GB" dirty="0"/>
-          </a:p>
-        </p:txBody>
-      </p:sp>
-      <p:sp>
-        <p:nvSpPr>
-          <p:cNvPr id="37" name="TextBox 36"/>
-          <p:cNvSpPr txBox="1"/>
-          <p:nvPr/>
-        </p:nvSpPr>
-        <p:spPr>
-          <a:xfrm>
-            <a:off x="639122" y="3701378"/>
-            <a:ext cx="1291829" cy="646331"/>
-          </a:xfrm>
-          <a:prstGeom prst="rect">
-            <a:avLst/>
-          </a:prstGeom>
-          <a:noFill/>
-        </p:spPr>
-        <p:txBody>
-          <a:bodyPr wrap="none" rtlCol="0">
-            <a:spAutoFit/>
-          </a:bodyPr>
-          <a:lstStyle/>
-          <a:p>
-            <a:r>
-              <a:rPr lang="en-US" dirty="0"/>
-              <a:t>Source</a:t>
-            </a:r>
-          </a:p>
-          <a:p>
-            <a:r>
-              <a:rPr lang="en-US" dirty="0"/>
-              <a:t>Component</a:t>
-            </a:r>
-          </a:p>
-        </p:txBody>
-      </p:sp>
-      <p:sp>
-        <p:nvSpPr>
-          <p:cNvPr id="38" name="TextBox 37"/>
-          <p:cNvSpPr txBox="1"/>
-          <p:nvPr/>
-        </p:nvSpPr>
-        <p:spPr>
-          <a:xfrm>
-            <a:off x="7968537" y="4935273"/>
-            <a:ext cx="1291829" cy="646331"/>
-          </a:xfrm>
-          <a:prstGeom prst="rect">
-            <a:avLst/>
-          </a:prstGeom>
-          <a:noFill/>
-        </p:spPr>
-        <p:txBody>
-          <a:bodyPr wrap="none" rtlCol="0">
-            <a:spAutoFit/>
-          </a:bodyPr>
-          <a:lstStyle/>
-          <a:p>
-            <a:r>
-              <a:rPr lang="en-US" dirty="0"/>
-              <a:t>Destination</a:t>
-            </a:r>
-          </a:p>
-          <a:p>
-            <a:r>
-              <a:rPr lang="en-US" dirty="0"/>
-              <a:t>Component</a:t>
-            </a:r>
-          </a:p>
-        </p:txBody>
-      </p:sp>
-    </p:spTree>
-    <p:extLst>
-      <p:ext uri="{BB962C8B-B14F-4D97-AF65-F5344CB8AC3E}">
-        <p14:creationId xmlns:p14="http://schemas.microsoft.com/office/powerpoint/2010/main" val="2734245144"/>
-      </p:ext>
-    </p:extLst>
-  </p:cSld>
-  <p:clrMapOvr>
-    <a:masterClrMapping/>
-  </p:clrMapOvr>
-</p:sld>
-</file>
-
-<file path=ppt/slides/slide4.xml><?xml version="1.0" encoding="utf-8"?>
-<p:sld xmlns:a="http://schemas.openxmlformats.org/drawingml/2006/main" xmlns:r="http://schemas.openxmlformats.org/officeDocument/2006/relationships" xmlns:p="http://schemas.openxmlformats.org/presentationml/2006/main">
-  <p:cSld>
-    <p:spTree>
-      <p:nvGrpSpPr>
-        <p:cNvPr id="1" name=""/>
-        <p:cNvGrpSpPr/>
-        <p:nvPr/>
-      </p:nvGrpSpPr>
-      <p:grpSpPr>
-        <a:xfrm>
-          <a:off x="0" y="0"/>
-          <a:ext cx="0" cy="0"/>
-          <a:chOff x="0" y="0"/>
-          <a:chExt cx="0" cy="0"/>
-        </a:xfrm>
-      </p:grpSpPr>
-      <p:sp>
-        <p:nvSpPr>
-          <p:cNvPr id="2" name="Title 1"/>
-          <p:cNvSpPr>
-            <a:spLocks noGrp="1"/>
-          </p:cNvSpPr>
-          <p:nvPr>
-            <p:ph type="title"/>
-          </p:nvPr>
-        </p:nvSpPr>
-        <p:spPr/>
-        <p:txBody>
-          <a:bodyPr/>
-          <a:lstStyle/>
-          <a:p>
-            <a:endParaRPr lang="en-GB"/>
-          </a:p>
-        </p:txBody>
-      </p:sp>
-      <p:sp>
-        <p:nvSpPr>
-          <p:cNvPr id="3" name="Content Placeholder 2"/>
-          <p:cNvSpPr>
-            <a:spLocks noGrp="1"/>
-          </p:cNvSpPr>
-          <p:nvPr>
-            <p:ph idx="1"/>
-          </p:nvPr>
-        </p:nvSpPr>
-        <p:spPr/>
-        <p:txBody>
-          <a:bodyPr/>
-          <a:lstStyle/>
-          <a:p>
-            <a:endParaRPr lang="en-GB" dirty="0"/>
-          </a:p>
-        </p:txBody>
-      </p:sp>
-    </p:spTree>
-    <p:extLst>
-      <p:ext uri="{BB962C8B-B14F-4D97-AF65-F5344CB8AC3E}">
-        <p14:creationId xmlns:p14="http://schemas.microsoft.com/office/powerpoint/2010/main" val="1536461830"/>
-      </p:ext>
-    </p:extLst>
-  </p:cSld>
-  <p:clrMapOvr>
-    <a:masterClrMapping/>
-  </p:clrMapOvr>
-</p:sld>
-</file>
-
 <file path=ppt/theme/theme1.xml><?xml version="1.0" encoding="utf-8"?>
 <a:theme xmlns:a="http://schemas.openxmlformats.org/drawingml/2006/main" name="Office Theme">
   <a:themeElements>

</xml_diff>